<commit_message>
externals/cmsis: Update to CMSIS 5.8.0
git clone --depth=1 -b 5.8.0 https://github.com/ARM-software/CMSIS_5
See the following manual for more details of CMSIS.
http://arm-software.github.io/CMSIS_5/General/html/index.html
</commit_message>
<xml_diff>
--- a/externals/cmsis/CMSIS_5/CMSIS/DoxyGen/Core/src/images/ARMv8-M_images.pptx
+++ b/externals/cmsis/CMSIS_5/CMSIS/DoxyGen/Core/src/images/ARMv8-M_images.pptx
@@ -6,10 +6,10 @@
     <p:sldMasterId id="2147483731" r:id="rId5"/>
   </p:sldMasterIdLst>
   <p:notesMasterIdLst>
-    <p:notesMasterId r:id="rId18"/>
+    <p:notesMasterId r:id="rId19"/>
   </p:notesMasterIdLst>
   <p:handoutMasterIdLst>
-    <p:handoutMasterId r:id="rId19"/>
+    <p:handoutMasterId r:id="rId20"/>
   </p:handoutMasterIdLst>
   <p:sldIdLst>
     <p:sldId id="268" r:id="rId6"/>
@@ -24,6 +24,7 @@
     <p:sldId id="276" r:id="rId15"/>
     <p:sldId id="277" r:id="rId16"/>
     <p:sldId id="278" r:id="rId17"/>
+    <p:sldId id="279" r:id="rId18"/>
   </p:sldIdLst>
   <p:sldSz cx="12188825" cy="6858000"/>
   <p:notesSz cx="6794500" cy="9918700"/>
@@ -130,7 +131,7 @@
             <a:srgbClr val="A4A3A4"/>
           </p15:clr>
         </p15:guide>
-        <p15:guide id="2" pos="6861">
+        <p15:guide id="2" pos="6855" userDrawn="1">
           <p15:clr>
             <a:srgbClr val="A4A3A4"/>
           </p15:clr>
@@ -247,7 +248,7 @@
             <a:fld id="{E72D30EF-8F20-0B47-8B5D-39A8BC29E860}" type="datetimeFigureOut">
               <a:rPr lang="en-US" smtClean="0"/>
               <a:pPr/>
-              <a:t>2017-05-08</a:t>
+              <a:t>2/5/2021</a:t>
             </a:fld>
             <a:endParaRPr lang="en-US"/>
           </a:p>
@@ -415,7 +416,7 @@
             <a:fld id="{77EDD36E-1E02-F241-9611-1F1D9EAAD326}" type="datetimeFigureOut">
               <a:rPr lang="en-US" smtClean="0"/>
               <a:pPr/>
-              <a:t>2017-05-08</a:t>
+              <a:t>2/5/2021</a:t>
             </a:fld>
             <a:endParaRPr lang="en-US"/>
           </a:p>
@@ -17947,10 +17948,7 @@
             <a:avLst/>
           </a:prstGeom>
           <a:solidFill>
-            <a:schemeClr val="accent3">
-              <a:lumMod val="20000"/>
-              <a:lumOff val="80000"/>
-            </a:schemeClr>
+            <a:srgbClr val="00B0F0"/>
           </a:solidFill>
           <a:ln w="9525" cap="flat" cmpd="sng" algn="ctr">
             <a:solidFill>
@@ -18033,7 +18031,7 @@
                 <a:ea typeface="+mn-ea"/>
                 <a:cs typeface="Courier New" panose="02070309020205020404" pitchFamily="49" charset="0"/>
               </a:rPr>
-              <a:t>&gt;.s</a:t>
+              <a:t>&gt;.c</a:t>
             </a:r>
             <a:br>
               <a:rPr kumimoji="0" lang="en-US" sz="1400" b="0" i="0" u="none" strike="noStrike" kern="1200" cap="none" spc="0" normalizeH="0" baseline="0" noProof="0" dirty="0">
@@ -18100,7 +18098,7 @@
             <a:avLst/>
           </a:prstGeom>
           <a:solidFill>
-            <a:srgbClr val="C5EDF8"/>
+            <a:srgbClr val="00B0F0"/>
           </a:solidFill>
           <a:ln w="9525" cap="flat" cmpd="sng" algn="ctr">
             <a:solidFill>
@@ -18283,7 +18281,7 @@
             <a:avLst/>
           </a:prstGeom>
           <a:solidFill>
-            <a:srgbClr val="D5D6D6">
+            <a:srgbClr val="B5CDD8">
               <a:alpha val="50000"/>
             </a:srgbClr>
           </a:solidFill>
@@ -18915,10 +18913,7 @@
             <a:avLst/>
           </a:prstGeom>
           <a:solidFill>
-            <a:schemeClr val="accent3">
-              <a:lumMod val="40000"/>
-              <a:lumOff val="60000"/>
-            </a:schemeClr>
+            <a:srgbClr val="00B0F0"/>
           </a:solidFill>
           <a:ln w="9525" cap="flat" cmpd="sng" algn="ctr">
             <a:solidFill>
@@ -19409,7 +19404,7 @@
             <a:avLst/>
           </a:prstGeom>
           <a:solidFill>
-            <a:srgbClr val="D5D6D6">
+            <a:srgbClr val="B5CDD8">
               <a:alpha val="50000"/>
             </a:srgbClr>
           </a:solidFill>
@@ -19739,6 +19734,2193 @@
     <p:extLst>
       <p:ext uri="{BB962C8B-B14F-4D97-AF65-F5344CB8AC3E}">
         <p14:creationId xmlns:p14="http://schemas.microsoft.com/office/powerpoint/2010/main" val="2913101184"/>
+      </p:ext>
+    </p:extLst>
+  </p:cSld>
+  <p:clrMapOvr>
+    <a:masterClrMapping/>
+  </p:clrMapOvr>
+</p:sld>
+</file>
+
+<file path=ppt/slides/slide13.xml><?xml version="1.0" encoding="utf-8"?>
+<p:sld xmlns:a="http://schemas.openxmlformats.org/drawingml/2006/main" xmlns:r="http://schemas.openxmlformats.org/officeDocument/2006/relationships" xmlns:p="http://schemas.openxmlformats.org/presentationml/2006/main">
+  <p:cSld>
+    <p:spTree>
+      <p:nvGrpSpPr>
+        <p:cNvPr id="1" name=""/>
+        <p:cNvGrpSpPr/>
+        <p:nvPr/>
+      </p:nvGrpSpPr>
+      <p:grpSpPr>
+        <a:xfrm>
+          <a:off x="0" y="0"/>
+          <a:ext cx="0" cy="0"/>
+          <a:chOff x="0" y="0"/>
+          <a:chExt cx="0" cy="0"/>
+        </a:xfrm>
+      </p:grpSpPr>
+      <p:sp>
+        <p:nvSpPr>
+          <p:cNvPr id="8" name="Snip Single Corner Rectangle 7"/>
+          <p:cNvSpPr/>
+          <p:nvPr/>
+        </p:nvSpPr>
+        <p:spPr bwMode="auto">
+          <a:xfrm>
+            <a:off x="820738" y="1680907"/>
+            <a:ext cx="2412000" cy="936000"/>
+          </a:xfrm>
+          <a:prstGeom prst="snip1Rect">
+            <a:avLst/>
+          </a:prstGeom>
+          <a:solidFill>
+            <a:srgbClr val="00B0F0"/>
+          </a:solidFill>
+          <a:ln w="9525" cap="flat" cmpd="sng" algn="ctr">
+            <a:solidFill>
+              <a:schemeClr val="tx1"/>
+            </a:solidFill>
+            <a:prstDash val="solid"/>
+            <a:round/>
+            <a:headEnd type="none" w="med" len="med"/>
+            <a:tailEnd type="triangle" w="lg" len="med"/>
+          </a:ln>
+          <a:effectLst/>
+        </p:spPr>
+        <p:txBody>
+          <a:bodyPr wrap="none" anchor="t" anchorCtr="1"/>
+          <a:lstStyle/>
+          <a:p>
+            <a:pPr marL="0" marR="0" lvl="0" indent="0" algn="ctr" defTabSz="457181" rtl="0" eaLnBrk="1" fontAlgn="auto" latinLnBrk="0" hangingPunct="1">
+              <a:lnSpc>
+                <a:spcPct val="100000"/>
+              </a:lnSpc>
+              <a:spcBef>
+                <a:spcPts val="0"/>
+              </a:spcBef>
+              <a:spcAft>
+                <a:spcPts val="0"/>
+              </a:spcAft>
+              <a:buClrTx/>
+              <a:buSzTx/>
+              <a:buFontTx/>
+              <a:buNone/>
+              <a:tabLst/>
+              <a:defRPr/>
+            </a:pPr>
+            <a:r>
+              <a:rPr kumimoji="0" lang="en-US" sz="1400" b="0" i="0" u="none" strike="noStrike" kern="1200" cap="none" spc="0" normalizeH="0" baseline="0" noProof="0" dirty="0">
+                <a:ln>
+                  <a:noFill/>
+                </a:ln>
+                <a:solidFill>
+                  <a:srgbClr val="414444"/>
+                </a:solidFill>
+                <a:effectLst/>
+                <a:uLnTx/>
+                <a:uFillTx/>
+                <a:latin typeface="Courier New" panose="02070309020205020404" pitchFamily="49" charset="0"/>
+                <a:ea typeface="+mn-ea"/>
+                <a:cs typeface="Courier New" panose="02070309020205020404" pitchFamily="49" charset="0"/>
+              </a:rPr>
+              <a:t>startup_&lt;</a:t>
+            </a:r>
+            <a:r>
+              <a:rPr kumimoji="0" lang="en-US" sz="1400" b="0" i="1" u="none" strike="noStrike" kern="1200" cap="none" spc="0" normalizeH="0" baseline="0" noProof="0" dirty="0">
+                <a:ln>
+                  <a:noFill/>
+                </a:ln>
+                <a:solidFill>
+                  <a:srgbClr val="414444"/>
+                </a:solidFill>
+                <a:effectLst/>
+                <a:uLnTx/>
+                <a:uFillTx/>
+                <a:latin typeface="Courier New" panose="02070309020205020404" pitchFamily="49" charset="0"/>
+                <a:ea typeface="+mn-ea"/>
+                <a:cs typeface="Courier New" panose="02070309020205020404" pitchFamily="49" charset="0"/>
+              </a:rPr>
+              <a:t>device</a:t>
+            </a:r>
+            <a:r>
+              <a:rPr kumimoji="0" lang="en-US" sz="1400" b="0" i="0" u="none" strike="noStrike" kern="1200" cap="none" spc="0" normalizeH="0" baseline="0" noProof="0" dirty="0">
+                <a:ln>
+                  <a:noFill/>
+                </a:ln>
+                <a:solidFill>
+                  <a:srgbClr val="414444"/>
+                </a:solidFill>
+                <a:effectLst/>
+                <a:uLnTx/>
+                <a:uFillTx/>
+                <a:latin typeface="Courier New" panose="02070309020205020404" pitchFamily="49" charset="0"/>
+                <a:ea typeface="+mn-ea"/>
+                <a:cs typeface="Courier New" panose="02070309020205020404" pitchFamily="49" charset="0"/>
+              </a:rPr>
+              <a:t>&gt;.c</a:t>
+            </a:r>
+            <a:br>
+              <a:rPr kumimoji="0" lang="en-US" sz="1400" b="0" i="0" u="none" strike="noStrike" kern="1200" cap="none" spc="0" normalizeH="0" baseline="0" noProof="0" dirty="0">
+                <a:ln>
+                  <a:noFill/>
+                </a:ln>
+                <a:solidFill>
+                  <a:srgbClr val="414444"/>
+                </a:solidFill>
+                <a:effectLst/>
+                <a:uLnTx/>
+                <a:uFillTx/>
+                <a:latin typeface="Courier New" panose="02070309020205020404" pitchFamily="49" charset="0"/>
+                <a:ea typeface="+mn-ea"/>
+                <a:cs typeface="Courier New" panose="02070309020205020404" pitchFamily="49" charset="0"/>
+              </a:rPr>
+            </a:br>
+            <a:r>
+              <a:rPr kumimoji="0" lang="en-US" sz="1600" b="0" i="0" u="none" strike="noStrike" kern="1200" cap="none" spc="0" normalizeH="0" baseline="0" noProof="0" dirty="0">
+                <a:ln>
+                  <a:noFill/>
+                </a:ln>
+                <a:solidFill>
+                  <a:srgbClr val="414444"/>
+                </a:solidFill>
+                <a:effectLst/>
+                <a:uLnTx/>
+                <a:uFillTx/>
+                <a:latin typeface="Calibri" panose="020F0502020204030204" pitchFamily="34" charset="0"/>
+                <a:cs typeface="Calibri" panose="020F0502020204030204" pitchFamily="34" charset="0"/>
+              </a:rPr>
+              <a:t>CMSIS device startup</a:t>
+            </a:r>
+          </a:p>
+        </p:txBody>
+      </p:sp>
+      <p:sp>
+        <p:nvSpPr>
+          <p:cNvPr id="9" name="Snip Single Corner Rectangle 8"/>
+          <p:cNvSpPr/>
+          <p:nvPr/>
+        </p:nvSpPr>
+        <p:spPr bwMode="auto">
+          <a:xfrm>
+            <a:off x="821483" y="2796907"/>
+            <a:ext cx="2412000" cy="936000"/>
+          </a:xfrm>
+          <a:prstGeom prst="snip1Rect">
+            <a:avLst/>
+          </a:prstGeom>
+          <a:solidFill>
+            <a:srgbClr val="00B0F0"/>
+          </a:solidFill>
+          <a:ln w="9525" cap="flat" cmpd="sng" algn="ctr">
+            <a:solidFill>
+              <a:schemeClr val="tx1"/>
+            </a:solidFill>
+            <a:prstDash val="solid"/>
+            <a:round/>
+            <a:headEnd type="none" w="med" len="med"/>
+            <a:tailEnd type="triangle" w="lg" len="med"/>
+          </a:ln>
+          <a:effectLst/>
+        </p:spPr>
+        <p:txBody>
+          <a:bodyPr wrap="none" anchor="t" anchorCtr="1"/>
+          <a:lstStyle/>
+          <a:p>
+            <a:pPr marL="0" marR="0" lvl="0" indent="0" algn="ctr" defTabSz="457181" rtl="0" eaLnBrk="1" fontAlgn="auto" latinLnBrk="0" hangingPunct="1">
+              <a:lnSpc>
+                <a:spcPct val="100000"/>
+              </a:lnSpc>
+              <a:spcBef>
+                <a:spcPts val="0"/>
+              </a:spcBef>
+              <a:spcAft>
+                <a:spcPts val="0"/>
+              </a:spcAft>
+              <a:buClrTx/>
+              <a:buSzTx/>
+              <a:buFontTx/>
+              <a:buNone/>
+              <a:tabLst/>
+              <a:defRPr/>
+            </a:pPr>
+            <a:r>
+              <a:rPr kumimoji="0" lang="en-US" sz="1400" b="0" i="0" u="none" strike="noStrike" kern="1200" cap="none" spc="0" normalizeH="0" baseline="0" noProof="0" dirty="0">
+                <a:ln>
+                  <a:noFill/>
+                </a:ln>
+                <a:solidFill>
+                  <a:srgbClr val="414444"/>
+                </a:solidFill>
+                <a:effectLst/>
+                <a:uLnTx/>
+                <a:uFillTx/>
+                <a:latin typeface="Courier New" panose="02070309020205020404" pitchFamily="49" charset="0"/>
+                <a:ea typeface="+mn-ea"/>
+                <a:cs typeface="Courier New" panose="02070309020205020404" pitchFamily="49" charset="0"/>
+              </a:rPr>
+              <a:t>system_&lt;</a:t>
+            </a:r>
+            <a:r>
+              <a:rPr kumimoji="0" lang="en-US" sz="1400" b="0" i="1" u="none" strike="noStrike" kern="1200" cap="none" spc="0" normalizeH="0" baseline="0" noProof="0" dirty="0">
+                <a:ln>
+                  <a:noFill/>
+                </a:ln>
+                <a:solidFill>
+                  <a:srgbClr val="414444"/>
+                </a:solidFill>
+                <a:effectLst/>
+                <a:uLnTx/>
+                <a:uFillTx/>
+                <a:latin typeface="Courier New" panose="02070309020205020404" pitchFamily="49" charset="0"/>
+                <a:ea typeface="+mn-ea"/>
+                <a:cs typeface="Courier New" panose="02070309020205020404" pitchFamily="49" charset="0"/>
+              </a:rPr>
+              <a:t>device </a:t>
+            </a:r>
+            <a:r>
+              <a:rPr kumimoji="0" lang="en-US" sz="1400" b="0" i="0" u="none" strike="noStrike" kern="1200" cap="none" spc="0" normalizeH="0" baseline="0" noProof="0" dirty="0">
+                <a:ln>
+                  <a:noFill/>
+                </a:ln>
+                <a:solidFill>
+                  <a:srgbClr val="414444"/>
+                </a:solidFill>
+                <a:effectLst/>
+                <a:uLnTx/>
+                <a:uFillTx/>
+                <a:latin typeface="Courier New" panose="02070309020205020404" pitchFamily="49" charset="0"/>
+                <a:ea typeface="+mn-ea"/>
+                <a:cs typeface="Courier New" panose="02070309020205020404" pitchFamily="49" charset="0"/>
+              </a:rPr>
+              <a:t>&gt;.c</a:t>
+            </a:r>
+            <a:br>
+              <a:rPr kumimoji="0" lang="en-US" sz="1600" b="0" i="0" u="none" strike="noStrike" kern="1200" cap="none" spc="0" normalizeH="0" baseline="0" noProof="0" dirty="0">
+                <a:ln>
+                  <a:noFill/>
+                </a:ln>
+                <a:solidFill>
+                  <a:srgbClr val="414444"/>
+                </a:solidFill>
+                <a:effectLst/>
+                <a:uLnTx/>
+                <a:uFillTx/>
+                <a:latin typeface="Gill Sans MT"/>
+                <a:ea typeface="+mn-ea"/>
+                <a:cs typeface="+mn-cs"/>
+              </a:rPr>
+            </a:br>
+            <a:r>
+              <a:rPr lang="en-US" sz="1600" dirty="0">
+                <a:solidFill>
+                  <a:srgbClr val="414444"/>
+                </a:solidFill>
+                <a:latin typeface="Calibri" panose="020F0502020204030204" pitchFamily="34" charset="0"/>
+                <a:cs typeface="Calibri" panose="020F0502020204030204" pitchFamily="34" charset="0"/>
+              </a:rPr>
+              <a:t>CMSIS system and</a:t>
+            </a:r>
+            <a:br>
+              <a:rPr lang="en-US" sz="1600" dirty="0">
+                <a:solidFill>
+                  <a:srgbClr val="414444"/>
+                </a:solidFill>
+                <a:latin typeface="Calibri" panose="020F0502020204030204" pitchFamily="34" charset="0"/>
+                <a:cs typeface="Calibri" panose="020F0502020204030204" pitchFamily="34" charset="0"/>
+              </a:rPr>
+            </a:br>
+            <a:r>
+              <a:rPr lang="en-US" sz="1600" dirty="0">
+                <a:solidFill>
+                  <a:srgbClr val="414444"/>
+                </a:solidFill>
+                <a:latin typeface="Calibri" panose="020F0502020204030204" pitchFamily="34" charset="0"/>
+                <a:cs typeface="Calibri" panose="020F0502020204030204" pitchFamily="34" charset="0"/>
+              </a:rPr>
+              <a:t>clock configuration</a:t>
+            </a:r>
+          </a:p>
+        </p:txBody>
+      </p:sp>
+      <p:sp>
+        <p:nvSpPr>
+          <p:cNvPr id="10" name="Snip Single Corner Rectangle 9"/>
+          <p:cNvSpPr/>
+          <p:nvPr/>
+        </p:nvSpPr>
+        <p:spPr bwMode="auto">
+          <a:xfrm>
+            <a:off x="822975" y="3912907"/>
+            <a:ext cx="2412000" cy="936000"/>
+          </a:xfrm>
+          <a:prstGeom prst="snip1Rect">
+            <a:avLst/>
+          </a:prstGeom>
+          <a:solidFill>
+            <a:srgbClr val="B5CDD8">
+              <a:alpha val="50000"/>
+            </a:srgbClr>
+          </a:solidFill>
+          <a:ln w="9525" cap="flat" cmpd="sng" algn="ctr">
+            <a:solidFill>
+              <a:schemeClr val="tx1"/>
+            </a:solidFill>
+            <a:prstDash val="solid"/>
+            <a:round/>
+            <a:headEnd type="none" w="med" len="med"/>
+            <a:tailEnd type="triangle" w="lg" len="med"/>
+          </a:ln>
+          <a:effectLst/>
+        </p:spPr>
+        <p:txBody>
+          <a:bodyPr wrap="none" anchor="t" anchorCtr="1"/>
+          <a:lstStyle/>
+          <a:p>
+            <a:pPr marL="0" marR="0" lvl="0" indent="0" algn="ctr" defTabSz="457181" rtl="0" eaLnBrk="1" fontAlgn="auto" latinLnBrk="0" hangingPunct="1">
+              <a:lnSpc>
+                <a:spcPct val="100000"/>
+              </a:lnSpc>
+              <a:spcBef>
+                <a:spcPts val="0"/>
+              </a:spcBef>
+              <a:spcAft>
+                <a:spcPts val="0"/>
+              </a:spcAft>
+              <a:buClrTx/>
+              <a:buSzTx/>
+              <a:buFontTx/>
+              <a:buNone/>
+              <a:tabLst/>
+              <a:defRPr/>
+            </a:pPr>
+            <a:r>
+              <a:rPr kumimoji="0" lang="en-US" sz="1400" b="0" i="0" u="none" strike="noStrike" kern="1200" cap="none" spc="0" normalizeH="0" baseline="0" noProof="0" dirty="0">
+                <a:ln>
+                  <a:noFill/>
+                </a:ln>
+                <a:solidFill>
+                  <a:srgbClr val="414444"/>
+                </a:solidFill>
+                <a:effectLst/>
+                <a:uLnTx/>
+                <a:uFillTx/>
+                <a:latin typeface="Courier New" panose="02070309020205020404" pitchFamily="49" charset="0"/>
+                <a:ea typeface="+mn-ea"/>
+                <a:cs typeface="Courier New" panose="02070309020205020404" pitchFamily="49" charset="0"/>
+              </a:rPr>
+              <a:t>&lt;</a:t>
+            </a:r>
+            <a:r>
+              <a:rPr kumimoji="0" lang="en-US" sz="1400" b="0" i="1" u="none" strike="noStrike" kern="1200" cap="none" spc="0" normalizeH="0" baseline="0" noProof="0" dirty="0">
+                <a:ln>
+                  <a:noFill/>
+                </a:ln>
+                <a:solidFill>
+                  <a:srgbClr val="414444"/>
+                </a:solidFill>
+                <a:effectLst/>
+                <a:uLnTx/>
+                <a:uFillTx/>
+                <a:latin typeface="Courier New" panose="02070309020205020404" pitchFamily="49" charset="0"/>
+                <a:ea typeface="+mn-ea"/>
+                <a:cs typeface="Courier New" panose="02070309020205020404" pitchFamily="49" charset="0"/>
+              </a:rPr>
+              <a:t>user </a:t>
+            </a:r>
+            <a:r>
+              <a:rPr kumimoji="0" lang="en-US" sz="1400" b="0" i="0" u="none" strike="noStrike" kern="1200" cap="none" spc="0" normalizeH="0" baseline="0" noProof="0" dirty="0">
+                <a:ln>
+                  <a:noFill/>
+                </a:ln>
+                <a:solidFill>
+                  <a:srgbClr val="414444"/>
+                </a:solidFill>
+                <a:effectLst/>
+                <a:uLnTx/>
+                <a:uFillTx/>
+                <a:latin typeface="Courier New" panose="02070309020205020404" pitchFamily="49" charset="0"/>
+                <a:ea typeface="+mn-ea"/>
+                <a:cs typeface="Courier New" panose="02070309020205020404" pitchFamily="49" charset="0"/>
+              </a:rPr>
+              <a:t>&gt;.c/</a:t>
+            </a:r>
+            <a:r>
+              <a:rPr kumimoji="0" lang="en-US" sz="1400" b="0" i="0" u="none" strike="noStrike" kern="1200" cap="none" spc="0" normalizeH="0" baseline="0" noProof="0" dirty="0" err="1">
+                <a:ln>
+                  <a:noFill/>
+                </a:ln>
+                <a:solidFill>
+                  <a:srgbClr val="414444"/>
+                </a:solidFill>
+                <a:effectLst/>
+                <a:uLnTx/>
+                <a:uFillTx/>
+                <a:latin typeface="Courier New" panose="02070309020205020404" pitchFamily="49" charset="0"/>
+                <a:ea typeface="+mn-ea"/>
+                <a:cs typeface="Courier New" panose="02070309020205020404" pitchFamily="49" charset="0"/>
+              </a:rPr>
+              <a:t>c++</a:t>
+            </a:r>
+            <a:br>
+              <a:rPr kumimoji="0" lang="en-US" sz="1400" b="0" i="0" u="none" strike="noStrike" kern="1200" cap="none" spc="0" normalizeH="0" baseline="0" noProof="0" dirty="0">
+                <a:ln>
+                  <a:noFill/>
+                </a:ln>
+                <a:solidFill>
+                  <a:srgbClr val="414444"/>
+                </a:solidFill>
+                <a:effectLst/>
+                <a:uLnTx/>
+                <a:uFillTx/>
+                <a:latin typeface="Courier New" panose="02070309020205020404" pitchFamily="49" charset="0"/>
+                <a:ea typeface="+mn-ea"/>
+                <a:cs typeface="Courier New" panose="02070309020205020404" pitchFamily="49" charset="0"/>
+              </a:rPr>
+            </a:br>
+            <a:r>
+              <a:rPr lang="en-US" sz="1600" dirty="0">
+                <a:solidFill>
+                  <a:srgbClr val="414444"/>
+                </a:solidFill>
+                <a:latin typeface="Calibri" panose="020F0502020204030204" pitchFamily="34" charset="0"/>
+                <a:cs typeface="Calibri" panose="020F0502020204030204" pitchFamily="34" charset="0"/>
+              </a:rPr>
+              <a:t>User application</a:t>
+            </a:r>
+            <a:br>
+              <a:rPr kumimoji="0" lang="en-US" sz="1600" b="0" i="0" u="none" strike="noStrike" kern="1200" cap="none" spc="0" normalizeH="0" baseline="0" noProof="0" dirty="0">
+                <a:ln>
+                  <a:noFill/>
+                </a:ln>
+                <a:solidFill>
+                  <a:srgbClr val="414444"/>
+                </a:solidFill>
+                <a:effectLst/>
+                <a:uLnTx/>
+                <a:uFillTx/>
+                <a:latin typeface="Gill Sans MT"/>
+                <a:ea typeface="+mn-ea"/>
+                <a:cs typeface="+mn-cs"/>
+              </a:rPr>
+            </a:br>
+            <a:r>
+              <a:rPr kumimoji="0" lang="en-US" sz="1600" b="0" i="0" u="none" strike="noStrike" kern="1200" cap="none" spc="0" normalizeH="0" baseline="0" noProof="0" dirty="0">
+                <a:ln>
+                  <a:noFill/>
+                </a:ln>
+                <a:solidFill>
+                  <a:srgbClr val="414444"/>
+                </a:solidFill>
+                <a:effectLst/>
+                <a:uLnTx/>
+                <a:uFillTx/>
+                <a:latin typeface="Courier New" pitchFamily="49" charset="0"/>
+                <a:ea typeface="+mn-ea"/>
+                <a:cs typeface="Courier New" pitchFamily="49" charset="0"/>
+              </a:rPr>
+              <a:t>main() { ... }</a:t>
+            </a:r>
+          </a:p>
+        </p:txBody>
+      </p:sp>
+      <p:sp>
+        <p:nvSpPr>
+          <p:cNvPr id="11" name="Snip Single Corner Rectangle 10"/>
+          <p:cNvSpPr/>
+          <p:nvPr/>
+        </p:nvSpPr>
+        <p:spPr bwMode="auto">
+          <a:xfrm>
+            <a:off x="3922030" y="3914211"/>
+            <a:ext cx="2412000" cy="936000"/>
+          </a:xfrm>
+          <a:prstGeom prst="snip1Rect">
+            <a:avLst/>
+          </a:prstGeom>
+          <a:solidFill>
+            <a:schemeClr val="accent2">
+              <a:lumMod val="20000"/>
+              <a:lumOff val="80000"/>
+            </a:schemeClr>
+          </a:solidFill>
+          <a:ln w="9525" cap="flat" cmpd="sng" algn="ctr">
+            <a:solidFill>
+              <a:schemeClr val="tx1"/>
+            </a:solidFill>
+            <a:prstDash val="solid"/>
+            <a:round/>
+            <a:headEnd type="none" w="med" len="med"/>
+            <a:tailEnd type="triangle" w="med" len="med"/>
+          </a:ln>
+          <a:effectLst/>
+        </p:spPr>
+        <p:txBody>
+          <a:bodyPr wrap="none" anchor="t" anchorCtr="1"/>
+          <a:lstStyle/>
+          <a:p>
+            <a:pPr marL="0" marR="0" lvl="0" indent="0" algn="ctr" defTabSz="457181" rtl="0" eaLnBrk="1" fontAlgn="auto" latinLnBrk="0" hangingPunct="1">
+              <a:lnSpc>
+                <a:spcPct val="100000"/>
+              </a:lnSpc>
+              <a:spcBef>
+                <a:spcPts val="0"/>
+              </a:spcBef>
+              <a:spcAft>
+                <a:spcPts val="0"/>
+              </a:spcAft>
+              <a:buClrTx/>
+              <a:buSzTx/>
+              <a:buFontTx/>
+              <a:buNone/>
+              <a:tabLst/>
+              <a:defRPr/>
+            </a:pPr>
+            <a:r>
+              <a:rPr kumimoji="0" lang="en-US" sz="1400" b="0" i="0" u="none" strike="noStrike" kern="1200" cap="none" spc="0" normalizeH="0" baseline="0" noProof="0" dirty="0">
+                <a:ln>
+                  <a:noFill/>
+                </a:ln>
+                <a:solidFill>
+                  <a:srgbClr val="414444"/>
+                </a:solidFill>
+                <a:effectLst/>
+                <a:uLnTx/>
+                <a:uFillTx/>
+                <a:latin typeface="Courier New" panose="02070309020205020404" pitchFamily="49" charset="0"/>
+                <a:ea typeface="+mn-ea"/>
+                <a:cs typeface="Courier New" panose="02070309020205020404" pitchFamily="49" charset="0"/>
+              </a:rPr>
+              <a:t>&lt;</a:t>
+            </a:r>
+            <a:r>
+              <a:rPr kumimoji="0" lang="en-US" sz="1400" b="0" i="1" u="none" strike="noStrike" kern="1200" cap="none" spc="0" normalizeH="0" baseline="0" noProof="0" dirty="0">
+                <a:ln>
+                  <a:noFill/>
+                </a:ln>
+                <a:solidFill>
+                  <a:srgbClr val="414444"/>
+                </a:solidFill>
+                <a:effectLst/>
+                <a:uLnTx/>
+                <a:uFillTx/>
+                <a:latin typeface="Courier New" panose="02070309020205020404" pitchFamily="49" charset="0"/>
+                <a:ea typeface="+mn-ea"/>
+                <a:cs typeface="Courier New" panose="02070309020205020404" pitchFamily="49" charset="0"/>
+              </a:rPr>
+              <a:t>device </a:t>
+            </a:r>
+            <a:r>
+              <a:rPr kumimoji="0" lang="en-US" sz="1400" b="0" i="0" u="none" strike="noStrike" kern="1200" cap="none" spc="0" normalizeH="0" baseline="0" noProof="0" dirty="0">
+                <a:ln>
+                  <a:noFill/>
+                </a:ln>
+                <a:solidFill>
+                  <a:srgbClr val="414444"/>
+                </a:solidFill>
+                <a:effectLst/>
+                <a:uLnTx/>
+                <a:uFillTx/>
+                <a:latin typeface="Courier New" panose="02070309020205020404" pitchFamily="49" charset="0"/>
+                <a:ea typeface="+mn-ea"/>
+                <a:cs typeface="Courier New" panose="02070309020205020404" pitchFamily="49" charset="0"/>
+              </a:rPr>
+              <a:t>&gt;.h</a:t>
+            </a:r>
+            <a:br>
+              <a:rPr kumimoji="0" lang="en-US" sz="1400" b="0" i="0" u="none" strike="noStrike" kern="1200" cap="none" spc="0" normalizeH="0" baseline="0" noProof="0" dirty="0">
+                <a:ln>
+                  <a:noFill/>
+                </a:ln>
+                <a:solidFill>
+                  <a:srgbClr val="414444"/>
+                </a:solidFill>
+                <a:effectLst/>
+                <a:uLnTx/>
+                <a:uFillTx/>
+                <a:latin typeface="Courier New" panose="02070309020205020404" pitchFamily="49" charset="0"/>
+                <a:ea typeface="+mn-ea"/>
+                <a:cs typeface="Courier New" panose="02070309020205020404" pitchFamily="49" charset="0"/>
+              </a:rPr>
+            </a:br>
+            <a:r>
+              <a:rPr lang="en-US" sz="1600" dirty="0">
+                <a:solidFill>
+                  <a:srgbClr val="414444"/>
+                </a:solidFill>
+                <a:latin typeface="Calibri" panose="020F0502020204030204" pitchFamily="34" charset="0"/>
+                <a:cs typeface="Calibri" panose="020F0502020204030204" pitchFamily="34" charset="0"/>
+              </a:rPr>
+              <a:t>CMSIS</a:t>
+            </a:r>
+            <a:br>
+              <a:rPr lang="en-US" sz="1600" dirty="0">
+                <a:solidFill>
+                  <a:srgbClr val="414444"/>
+                </a:solidFill>
+                <a:latin typeface="Calibri" panose="020F0502020204030204" pitchFamily="34" charset="0"/>
+                <a:cs typeface="Calibri" panose="020F0502020204030204" pitchFamily="34" charset="0"/>
+              </a:rPr>
+            </a:br>
+            <a:r>
+              <a:rPr lang="en-US" sz="1600" dirty="0">
+                <a:solidFill>
+                  <a:srgbClr val="414444"/>
+                </a:solidFill>
+                <a:latin typeface="Calibri" panose="020F0502020204030204" pitchFamily="34" charset="0"/>
+                <a:cs typeface="Calibri" panose="020F0502020204030204" pitchFamily="34" charset="0"/>
+              </a:rPr>
+              <a:t>device peripheral access</a:t>
+            </a:r>
+          </a:p>
+        </p:txBody>
+      </p:sp>
+      <p:cxnSp>
+        <p:nvCxnSpPr>
+          <p:cNvPr id="12" name="Straight Arrow Connector 26"/>
+          <p:cNvCxnSpPr>
+            <a:cxnSpLocks noChangeShapeType="1"/>
+            <a:stCxn id="11" idx="2"/>
+            <a:endCxn id="10" idx="0"/>
+          </p:cNvCxnSpPr>
+          <p:nvPr/>
+        </p:nvCxnSpPr>
+        <p:spPr bwMode="auto">
+          <a:xfrm flipH="1" flipV="1">
+            <a:off x="3234975" y="4380907"/>
+            <a:ext cx="687055" cy="1304"/>
+          </a:xfrm>
+          <a:prstGeom prst="straightConnector1">
+            <a:avLst/>
+          </a:prstGeom>
+          <a:noFill/>
+          <a:ln w="9525" algn="ctr">
+            <a:solidFill>
+              <a:schemeClr val="tx1"/>
+            </a:solidFill>
+            <a:round/>
+            <a:headEnd/>
+            <a:tailEnd type="triangle" w="med" len="med"/>
+          </a:ln>
+          <a:extLst>
+            <a:ext uri="{909E8E84-426E-40DD-AFC4-6F175D3DCCD1}">
+              <a14:hiddenFill xmlns:a14="http://schemas.microsoft.com/office/drawing/2010/main">
+                <a:noFill/>
+              </a14:hiddenFill>
+            </a:ext>
+          </a:extLst>
+        </p:spPr>
+      </p:cxnSp>
+      <p:sp>
+        <p:nvSpPr>
+          <p:cNvPr id="24" name="Snip Single Corner Rectangle 23"/>
+          <p:cNvSpPr/>
+          <p:nvPr/>
+        </p:nvSpPr>
+        <p:spPr bwMode="auto">
+          <a:xfrm>
+            <a:off x="3922030" y="2796907"/>
+            <a:ext cx="2412000" cy="936000"/>
+          </a:xfrm>
+          <a:prstGeom prst="snip1Rect">
+            <a:avLst/>
+          </a:prstGeom>
+          <a:solidFill>
+            <a:schemeClr val="accent2">
+              <a:lumMod val="20000"/>
+              <a:lumOff val="80000"/>
+            </a:schemeClr>
+          </a:solidFill>
+          <a:ln w="9525" cap="flat" cmpd="sng" algn="ctr">
+            <a:solidFill>
+              <a:schemeClr val="tx1"/>
+            </a:solidFill>
+            <a:prstDash val="solid"/>
+            <a:round/>
+            <a:headEnd type="none" w="med" len="med"/>
+            <a:tailEnd type="triangle" w="med" len="med"/>
+          </a:ln>
+          <a:effectLst/>
+        </p:spPr>
+        <p:txBody>
+          <a:bodyPr wrap="none" anchor="t" anchorCtr="1"/>
+          <a:lstStyle/>
+          <a:p>
+            <a:pPr marL="0" marR="0" lvl="0" indent="0" algn="ctr" defTabSz="457181" rtl="0" eaLnBrk="1" fontAlgn="auto" latinLnBrk="0" hangingPunct="1">
+              <a:lnSpc>
+                <a:spcPct val="100000"/>
+              </a:lnSpc>
+              <a:spcBef>
+                <a:spcPts val="0"/>
+              </a:spcBef>
+              <a:spcAft>
+                <a:spcPts val="0"/>
+              </a:spcAft>
+              <a:buClrTx/>
+              <a:buSzTx/>
+              <a:buFontTx/>
+              <a:buNone/>
+              <a:tabLst/>
+              <a:defRPr/>
+            </a:pPr>
+            <a:r>
+              <a:rPr kumimoji="0" lang="en-US" sz="1400" b="0" i="0" u="none" strike="noStrike" kern="1200" cap="none" spc="0" normalizeH="0" baseline="0" noProof="0" dirty="0">
+                <a:ln>
+                  <a:noFill/>
+                </a:ln>
+                <a:solidFill>
+                  <a:srgbClr val="414444"/>
+                </a:solidFill>
+                <a:effectLst/>
+                <a:uLnTx/>
+                <a:uFillTx/>
+                <a:latin typeface="Courier New" panose="02070309020205020404" pitchFamily="49" charset="0"/>
+                <a:ea typeface="+mn-ea"/>
+                <a:cs typeface="Courier New" panose="02070309020205020404" pitchFamily="49" charset="0"/>
+              </a:rPr>
+              <a:t>partitions_</a:t>
+            </a:r>
+            <a:r>
+              <a:rPr kumimoji="0" lang="en-US" sz="1400" b="0" i="1" u="none" strike="noStrike" kern="1200" cap="none" spc="0" normalizeH="0" baseline="0" noProof="0" dirty="0">
+                <a:ln>
+                  <a:noFill/>
+                </a:ln>
+                <a:solidFill>
+                  <a:srgbClr val="414444"/>
+                </a:solidFill>
+                <a:effectLst/>
+                <a:uLnTx/>
+                <a:uFillTx/>
+                <a:latin typeface="Courier New" panose="02070309020205020404" pitchFamily="49" charset="0"/>
+                <a:ea typeface="+mn-ea"/>
+                <a:cs typeface="Courier New" panose="02070309020205020404" pitchFamily="49" charset="0"/>
+              </a:rPr>
+              <a:t>&lt;device&gt;</a:t>
+            </a:r>
+            <a:r>
+              <a:rPr kumimoji="0" lang="en-US" sz="1400" b="0" i="0" u="none" strike="noStrike" kern="1200" cap="none" spc="0" normalizeH="0" baseline="0" noProof="0" dirty="0">
+                <a:ln>
+                  <a:noFill/>
+                </a:ln>
+                <a:solidFill>
+                  <a:srgbClr val="414444"/>
+                </a:solidFill>
+                <a:effectLst/>
+                <a:uLnTx/>
+                <a:uFillTx/>
+                <a:latin typeface="Courier New" panose="02070309020205020404" pitchFamily="49" charset="0"/>
+                <a:ea typeface="+mn-ea"/>
+                <a:cs typeface="Courier New" panose="02070309020205020404" pitchFamily="49" charset="0"/>
+              </a:rPr>
+              <a:t>.h</a:t>
+            </a:r>
+            <a:br>
+              <a:rPr kumimoji="0" lang="en-US" sz="1600" b="0" i="0" u="none" strike="noStrike" kern="1200" cap="none" spc="0" normalizeH="0" baseline="0" noProof="0" dirty="0">
+                <a:ln>
+                  <a:noFill/>
+                </a:ln>
+                <a:solidFill>
+                  <a:srgbClr val="414444"/>
+                </a:solidFill>
+                <a:effectLst/>
+                <a:uLnTx/>
+                <a:uFillTx/>
+                <a:latin typeface="Gill Sans MT"/>
+                <a:ea typeface="+mn-ea"/>
+                <a:cs typeface="+mn-cs"/>
+              </a:rPr>
+            </a:br>
+            <a:r>
+              <a:rPr kumimoji="0" lang="en-US" sz="1600" b="0" i="0" u="none" strike="noStrike" kern="1200" cap="none" spc="0" normalizeH="0" baseline="0" noProof="0" dirty="0">
+                <a:ln>
+                  <a:noFill/>
+                </a:ln>
+                <a:solidFill>
+                  <a:srgbClr val="414444"/>
+                </a:solidFill>
+                <a:effectLst/>
+                <a:uLnTx/>
+                <a:uFillTx/>
+                <a:latin typeface="Gill Sans MT"/>
+                <a:ea typeface="+mn-ea"/>
+                <a:cs typeface="+mn-cs"/>
+              </a:rPr>
+              <a:t>  </a:t>
+            </a:r>
+            <a:r>
+              <a:rPr lang="en-US" sz="1600" dirty="0">
+                <a:solidFill>
+                  <a:srgbClr val="414444"/>
+                </a:solidFill>
+                <a:latin typeface="Calibri" panose="020F0502020204030204" pitchFamily="34" charset="0"/>
+                <a:cs typeface="Calibri" panose="020F0502020204030204" pitchFamily="34" charset="0"/>
+              </a:rPr>
+              <a:t>Secure attributes and</a:t>
+            </a:r>
+            <a:br>
+              <a:rPr lang="en-US" sz="1600" dirty="0">
+                <a:solidFill>
+                  <a:srgbClr val="414444"/>
+                </a:solidFill>
+                <a:latin typeface="Calibri" panose="020F0502020204030204" pitchFamily="34" charset="0"/>
+                <a:cs typeface="Calibri" panose="020F0502020204030204" pitchFamily="34" charset="0"/>
+              </a:rPr>
+            </a:br>
+            <a:r>
+              <a:rPr lang="en-US" sz="1600" dirty="0">
+                <a:solidFill>
+                  <a:srgbClr val="414444"/>
+                </a:solidFill>
+                <a:latin typeface="Calibri" panose="020F0502020204030204" pitchFamily="34" charset="0"/>
+                <a:cs typeface="Calibri" panose="020F0502020204030204" pitchFamily="34" charset="0"/>
+              </a:rPr>
+              <a:t>interrupt assignment</a:t>
+            </a:r>
+          </a:p>
+        </p:txBody>
+      </p:sp>
+      <p:cxnSp>
+        <p:nvCxnSpPr>
+          <p:cNvPr id="25" name="Straight Arrow Connector 26"/>
+          <p:cNvCxnSpPr>
+            <a:cxnSpLocks noChangeShapeType="1"/>
+            <a:stCxn id="24" idx="2"/>
+            <a:endCxn id="9" idx="0"/>
+          </p:cNvCxnSpPr>
+          <p:nvPr/>
+        </p:nvCxnSpPr>
+        <p:spPr bwMode="auto">
+          <a:xfrm flipH="1">
+            <a:off x="3233483" y="3264907"/>
+            <a:ext cx="688547" cy="0"/>
+          </a:xfrm>
+          <a:prstGeom prst="straightConnector1">
+            <a:avLst/>
+          </a:prstGeom>
+          <a:noFill/>
+          <a:ln w="9525" algn="ctr">
+            <a:solidFill>
+              <a:schemeClr val="tx1"/>
+            </a:solidFill>
+            <a:round/>
+            <a:headEnd/>
+            <a:tailEnd type="triangle" w="med" len="med"/>
+          </a:ln>
+          <a:extLst>
+            <a:ext uri="{909E8E84-426E-40DD-AFC4-6F175D3DCCD1}">
+              <a14:hiddenFill xmlns:a14="http://schemas.microsoft.com/office/drawing/2010/main">
+                <a:noFill/>
+              </a14:hiddenFill>
+            </a:ext>
+          </a:extLst>
+        </p:spPr>
+      </p:cxnSp>
+      <p:sp>
+        <p:nvSpPr>
+          <p:cNvPr id="28" name="Snip Single Corner Rectangle 27"/>
+          <p:cNvSpPr/>
+          <p:nvPr/>
+        </p:nvSpPr>
+        <p:spPr bwMode="auto">
+          <a:xfrm>
+            <a:off x="820738" y="5029697"/>
+            <a:ext cx="552307" cy="330201"/>
+          </a:xfrm>
+          <a:prstGeom prst="snip1Rect">
+            <a:avLst/>
+          </a:prstGeom>
+          <a:solidFill>
+            <a:srgbClr val="00B0F0"/>
+          </a:solidFill>
+          <a:ln w="9525" cap="flat" cmpd="sng" algn="ctr">
+            <a:solidFill>
+              <a:schemeClr val="tx1"/>
+            </a:solidFill>
+            <a:prstDash val="solid"/>
+            <a:round/>
+            <a:headEnd type="none" w="med" len="med"/>
+            <a:tailEnd type="triangle" w="lg" len="med"/>
+          </a:ln>
+          <a:effectLst/>
+        </p:spPr>
+        <p:txBody>
+          <a:bodyPr wrap="none" lIns="121899" tIns="60949" rIns="121899" bIns="60949" anchor="b" anchorCtr="1"/>
+          <a:lstStyle/>
+          <a:p>
+            <a:pPr marL="0" marR="0" lvl="0" indent="0" algn="ctr" defTabSz="457181" rtl="0" eaLnBrk="1" fontAlgn="auto" latinLnBrk="0" hangingPunct="1">
+              <a:lnSpc>
+                <a:spcPct val="100000"/>
+              </a:lnSpc>
+              <a:spcBef>
+                <a:spcPts val="0"/>
+              </a:spcBef>
+              <a:spcAft>
+                <a:spcPts val="0"/>
+              </a:spcAft>
+              <a:buClrTx/>
+              <a:buSzTx/>
+              <a:buFontTx/>
+              <a:buNone/>
+              <a:tabLst/>
+              <a:defRPr/>
+            </a:pPr>
+            <a:endParaRPr kumimoji="0" lang="en-US" sz="1600" b="0" i="0" u="none" strike="noStrike" kern="1200" cap="none" spc="0" normalizeH="0" baseline="0" noProof="0" dirty="0">
+              <a:ln>
+                <a:noFill/>
+              </a:ln>
+              <a:solidFill>
+                <a:srgbClr val="414444"/>
+              </a:solidFill>
+              <a:effectLst/>
+              <a:uLnTx/>
+              <a:uFillTx/>
+              <a:latin typeface="Gill Sans MT"/>
+              <a:ea typeface="+mn-ea"/>
+              <a:cs typeface="Courier New" pitchFamily="49" charset="0"/>
+            </a:endParaRPr>
+          </a:p>
+        </p:txBody>
+      </p:sp>
+      <p:sp>
+        <p:nvSpPr>
+          <p:cNvPr id="29" name="Rectangle 12"/>
+          <p:cNvSpPr>
+            <a:spLocks noChangeArrowheads="1"/>
+          </p:cNvSpPr>
+          <p:nvPr/>
+        </p:nvSpPr>
+        <p:spPr bwMode="auto">
+          <a:xfrm>
+            <a:off x="1328377" y="5010142"/>
+            <a:ext cx="2356437" cy="369310"/>
+          </a:xfrm>
+          <a:prstGeom prst="rect">
+            <a:avLst/>
+          </a:prstGeom>
+          <a:noFill/>
+          <a:ln>
+            <a:noFill/>
+          </a:ln>
+          <a:extLst>
+            <a:ext uri="{909E8E84-426E-40DD-AFC4-6F175D3DCCD1}">
+              <a14:hiddenFill xmlns:a14="http://schemas.microsoft.com/office/drawing/2010/main">
+                <a:solidFill>
+                  <a:srgbClr val="FFFFFF"/>
+                </a:solidFill>
+              </a14:hiddenFill>
+            </a:ext>
+            <a:ext uri="{91240B29-F687-4F45-9708-019B960494DF}">
+              <a14:hiddenLine xmlns:a14="http://schemas.microsoft.com/office/drawing/2010/main" w="9525">
+                <a:solidFill>
+                  <a:srgbClr val="000000"/>
+                </a:solidFill>
+                <a:miter lim="800000"/>
+                <a:headEnd/>
+                <a:tailEnd/>
+              </a14:hiddenLine>
+            </a:ext>
+          </a:extLst>
+        </p:spPr>
+        <p:txBody>
+          <a:bodyPr wrap="square" lIns="121899" tIns="60949" rIns="121899" bIns="60949">
+            <a:spAutoFit/>
+          </a:bodyPr>
+          <a:lstStyle>
+            <a:lvl1pPr eaLnBrk="0" hangingPunct="0">
+              <a:defRPr sz="1400" b="1">
+                <a:solidFill>
+                  <a:srgbClr val="000000"/>
+                </a:solidFill>
+                <a:latin typeface="Arial" pitchFamily="34" charset="0"/>
+                <a:ea typeface="MS PGothic" pitchFamily="34" charset="-128"/>
+              </a:defRPr>
+            </a:lvl1pPr>
+            <a:lvl2pPr marL="742950" indent="-285750" eaLnBrk="0" hangingPunct="0">
+              <a:defRPr sz="1400" b="1">
+                <a:solidFill>
+                  <a:srgbClr val="000000"/>
+                </a:solidFill>
+                <a:latin typeface="Arial" pitchFamily="34" charset="0"/>
+                <a:ea typeface="MS PGothic" pitchFamily="34" charset="-128"/>
+              </a:defRPr>
+            </a:lvl2pPr>
+            <a:lvl3pPr marL="1143000" indent="-228600" eaLnBrk="0" hangingPunct="0">
+              <a:defRPr sz="1400" b="1">
+                <a:solidFill>
+                  <a:srgbClr val="000000"/>
+                </a:solidFill>
+                <a:latin typeface="Arial" pitchFamily="34" charset="0"/>
+                <a:ea typeface="MS PGothic" pitchFamily="34" charset="-128"/>
+              </a:defRPr>
+            </a:lvl3pPr>
+            <a:lvl4pPr marL="1600200" indent="-228600" eaLnBrk="0" hangingPunct="0">
+              <a:defRPr sz="1400" b="1">
+                <a:solidFill>
+                  <a:srgbClr val="000000"/>
+                </a:solidFill>
+                <a:latin typeface="Arial" pitchFamily="34" charset="0"/>
+                <a:ea typeface="MS PGothic" pitchFamily="34" charset="-128"/>
+              </a:defRPr>
+            </a:lvl4pPr>
+            <a:lvl5pPr marL="2057400" indent="-228600" eaLnBrk="0" hangingPunct="0">
+              <a:defRPr sz="1400" b="1">
+                <a:solidFill>
+                  <a:srgbClr val="000000"/>
+                </a:solidFill>
+                <a:latin typeface="Arial" pitchFamily="34" charset="0"/>
+                <a:ea typeface="MS PGothic" pitchFamily="34" charset="-128"/>
+              </a:defRPr>
+            </a:lvl5pPr>
+            <a:lvl6pPr marL="2514600" indent="-228600" eaLnBrk="0" fontAlgn="base" hangingPunct="0">
+              <a:spcBef>
+                <a:spcPct val="0"/>
+              </a:spcBef>
+              <a:spcAft>
+                <a:spcPct val="0"/>
+              </a:spcAft>
+              <a:defRPr sz="1400" b="1">
+                <a:solidFill>
+                  <a:srgbClr val="000000"/>
+                </a:solidFill>
+                <a:latin typeface="Arial" pitchFamily="34" charset="0"/>
+                <a:ea typeface="MS PGothic" pitchFamily="34" charset="-128"/>
+              </a:defRPr>
+            </a:lvl6pPr>
+            <a:lvl7pPr marL="2971800" indent="-228600" eaLnBrk="0" fontAlgn="base" hangingPunct="0">
+              <a:spcBef>
+                <a:spcPct val="0"/>
+              </a:spcBef>
+              <a:spcAft>
+                <a:spcPct val="0"/>
+              </a:spcAft>
+              <a:defRPr sz="1400" b="1">
+                <a:solidFill>
+                  <a:srgbClr val="000000"/>
+                </a:solidFill>
+                <a:latin typeface="Arial" pitchFamily="34" charset="0"/>
+                <a:ea typeface="MS PGothic" pitchFamily="34" charset="-128"/>
+              </a:defRPr>
+            </a:lvl7pPr>
+            <a:lvl8pPr marL="3429000" indent="-228600" eaLnBrk="0" fontAlgn="base" hangingPunct="0">
+              <a:spcBef>
+                <a:spcPct val="0"/>
+              </a:spcBef>
+              <a:spcAft>
+                <a:spcPct val="0"/>
+              </a:spcAft>
+              <a:defRPr sz="1400" b="1">
+                <a:solidFill>
+                  <a:srgbClr val="000000"/>
+                </a:solidFill>
+                <a:latin typeface="Arial" pitchFamily="34" charset="0"/>
+                <a:ea typeface="MS PGothic" pitchFamily="34" charset="-128"/>
+              </a:defRPr>
+            </a:lvl8pPr>
+            <a:lvl9pPr marL="3886200" indent="-228600" eaLnBrk="0" fontAlgn="base" hangingPunct="0">
+              <a:spcBef>
+                <a:spcPct val="0"/>
+              </a:spcBef>
+              <a:spcAft>
+                <a:spcPct val="0"/>
+              </a:spcAft>
+              <a:defRPr sz="1400" b="1">
+                <a:solidFill>
+                  <a:srgbClr val="000000"/>
+                </a:solidFill>
+                <a:latin typeface="Arial" pitchFamily="34" charset="0"/>
+                <a:ea typeface="MS PGothic" pitchFamily="34" charset="-128"/>
+              </a:defRPr>
+            </a:lvl9pPr>
+          </a:lstStyle>
+          <a:p>
+            <a:pPr marL="0" marR="0" lvl="0" indent="0" algn="l" defTabSz="457181" rtl="0" eaLnBrk="1" fontAlgn="auto" latinLnBrk="0" hangingPunct="1">
+              <a:lnSpc>
+                <a:spcPct val="100000"/>
+              </a:lnSpc>
+              <a:spcBef>
+                <a:spcPts val="0"/>
+              </a:spcBef>
+              <a:spcAft>
+                <a:spcPts val="0"/>
+              </a:spcAft>
+              <a:buClrTx/>
+              <a:buSzTx/>
+              <a:buFontTx/>
+              <a:buNone/>
+              <a:tabLst/>
+              <a:defRPr/>
+            </a:pPr>
+            <a:r>
+              <a:rPr kumimoji="0" lang="en-US" altLang="en-US" sz="1600" b="0" i="0" u="none" strike="noStrike" kern="1200" cap="none" spc="0" normalizeH="0" baseline="0" noProof="0" dirty="0">
+                <a:ln>
+                  <a:noFill/>
+                </a:ln>
+                <a:solidFill>
+                  <a:srgbClr val="414444"/>
+                </a:solidFill>
+                <a:effectLst/>
+                <a:uLnTx/>
+                <a:uFillTx/>
+                <a:latin typeface="Gill Sans MT"/>
+                <a:ea typeface="MS PGothic" pitchFamily="34" charset="-128"/>
+                <a:cs typeface="+mn-cs"/>
+              </a:rPr>
+              <a:t>CMSIS-CORE device files</a:t>
+            </a:r>
+            <a:endParaRPr kumimoji="0" lang="en-US" altLang="en-US" sz="1600" b="1" i="0" u="none" strike="noStrike" kern="1200" cap="none" spc="0" normalizeH="0" baseline="0" noProof="0" dirty="0">
+              <a:ln>
+                <a:noFill/>
+              </a:ln>
+              <a:solidFill>
+                <a:srgbClr val="414444"/>
+              </a:solidFill>
+              <a:effectLst/>
+              <a:uLnTx/>
+              <a:uFillTx/>
+              <a:latin typeface="Gill Sans MT"/>
+              <a:ea typeface="MS PGothic" pitchFamily="34" charset="-128"/>
+              <a:cs typeface="+mn-cs"/>
+            </a:endParaRPr>
+          </a:p>
+        </p:txBody>
+      </p:sp>
+      <p:sp>
+        <p:nvSpPr>
+          <p:cNvPr id="30" name="Rectangle 14"/>
+          <p:cNvSpPr>
+            <a:spLocks noChangeArrowheads="1"/>
+          </p:cNvSpPr>
+          <p:nvPr/>
+        </p:nvSpPr>
+        <p:spPr bwMode="auto">
+          <a:xfrm>
+            <a:off x="4474338" y="4948576"/>
+            <a:ext cx="2078862" cy="861752"/>
+          </a:xfrm>
+          <a:prstGeom prst="rect">
+            <a:avLst/>
+          </a:prstGeom>
+          <a:noFill/>
+          <a:ln>
+            <a:noFill/>
+          </a:ln>
+          <a:extLst>
+            <a:ext uri="{909E8E84-426E-40DD-AFC4-6F175D3DCCD1}">
+              <a14:hiddenFill xmlns:a14="http://schemas.microsoft.com/office/drawing/2010/main">
+                <a:solidFill>
+                  <a:srgbClr val="FFFFFF"/>
+                </a:solidFill>
+              </a14:hiddenFill>
+            </a:ext>
+            <a:ext uri="{91240B29-F687-4F45-9708-019B960494DF}">
+              <a14:hiddenLine xmlns:a14="http://schemas.microsoft.com/office/drawing/2010/main" w="9525">
+                <a:solidFill>
+                  <a:srgbClr val="000000"/>
+                </a:solidFill>
+                <a:miter lim="800000"/>
+                <a:headEnd/>
+                <a:tailEnd/>
+              </a14:hiddenLine>
+            </a:ext>
+          </a:extLst>
+        </p:spPr>
+        <p:txBody>
+          <a:bodyPr wrap="square" lIns="121899" tIns="60949" rIns="121899" bIns="60949">
+            <a:spAutoFit/>
+          </a:bodyPr>
+          <a:lstStyle>
+            <a:lvl1pPr eaLnBrk="0" hangingPunct="0">
+              <a:defRPr sz="1400" b="1">
+                <a:solidFill>
+                  <a:srgbClr val="000000"/>
+                </a:solidFill>
+                <a:latin typeface="Arial" pitchFamily="34" charset="0"/>
+                <a:ea typeface="MS PGothic" pitchFamily="34" charset="-128"/>
+              </a:defRPr>
+            </a:lvl1pPr>
+            <a:lvl2pPr marL="742950" indent="-285750" eaLnBrk="0" hangingPunct="0">
+              <a:defRPr sz="1400" b="1">
+                <a:solidFill>
+                  <a:srgbClr val="000000"/>
+                </a:solidFill>
+                <a:latin typeface="Arial" pitchFamily="34" charset="0"/>
+                <a:ea typeface="MS PGothic" pitchFamily="34" charset="-128"/>
+              </a:defRPr>
+            </a:lvl2pPr>
+            <a:lvl3pPr marL="1143000" indent="-228600" eaLnBrk="0" hangingPunct="0">
+              <a:defRPr sz="1400" b="1">
+                <a:solidFill>
+                  <a:srgbClr val="000000"/>
+                </a:solidFill>
+                <a:latin typeface="Arial" pitchFamily="34" charset="0"/>
+                <a:ea typeface="MS PGothic" pitchFamily="34" charset="-128"/>
+              </a:defRPr>
+            </a:lvl3pPr>
+            <a:lvl4pPr marL="1600200" indent="-228600" eaLnBrk="0" hangingPunct="0">
+              <a:defRPr sz="1400" b="1">
+                <a:solidFill>
+                  <a:srgbClr val="000000"/>
+                </a:solidFill>
+                <a:latin typeface="Arial" pitchFamily="34" charset="0"/>
+                <a:ea typeface="MS PGothic" pitchFamily="34" charset="-128"/>
+              </a:defRPr>
+            </a:lvl4pPr>
+            <a:lvl5pPr marL="2057400" indent="-228600" eaLnBrk="0" hangingPunct="0">
+              <a:defRPr sz="1400" b="1">
+                <a:solidFill>
+                  <a:srgbClr val="000000"/>
+                </a:solidFill>
+                <a:latin typeface="Arial" pitchFamily="34" charset="0"/>
+                <a:ea typeface="MS PGothic" pitchFamily="34" charset="-128"/>
+              </a:defRPr>
+            </a:lvl5pPr>
+            <a:lvl6pPr marL="2514600" indent="-228600" eaLnBrk="0" fontAlgn="base" hangingPunct="0">
+              <a:spcBef>
+                <a:spcPct val="0"/>
+              </a:spcBef>
+              <a:spcAft>
+                <a:spcPct val="0"/>
+              </a:spcAft>
+              <a:defRPr sz="1400" b="1">
+                <a:solidFill>
+                  <a:srgbClr val="000000"/>
+                </a:solidFill>
+                <a:latin typeface="Arial" pitchFamily="34" charset="0"/>
+                <a:ea typeface="MS PGothic" pitchFamily="34" charset="-128"/>
+              </a:defRPr>
+            </a:lvl6pPr>
+            <a:lvl7pPr marL="2971800" indent="-228600" eaLnBrk="0" fontAlgn="base" hangingPunct="0">
+              <a:spcBef>
+                <a:spcPct val="0"/>
+              </a:spcBef>
+              <a:spcAft>
+                <a:spcPct val="0"/>
+              </a:spcAft>
+              <a:defRPr sz="1400" b="1">
+                <a:solidFill>
+                  <a:srgbClr val="000000"/>
+                </a:solidFill>
+                <a:latin typeface="Arial" pitchFamily="34" charset="0"/>
+                <a:ea typeface="MS PGothic" pitchFamily="34" charset="-128"/>
+              </a:defRPr>
+            </a:lvl7pPr>
+            <a:lvl8pPr marL="3429000" indent="-228600" eaLnBrk="0" fontAlgn="base" hangingPunct="0">
+              <a:spcBef>
+                <a:spcPct val="0"/>
+              </a:spcBef>
+              <a:spcAft>
+                <a:spcPct val="0"/>
+              </a:spcAft>
+              <a:defRPr sz="1400" b="1">
+                <a:solidFill>
+                  <a:srgbClr val="000000"/>
+                </a:solidFill>
+                <a:latin typeface="Arial" pitchFamily="34" charset="0"/>
+                <a:ea typeface="MS PGothic" pitchFamily="34" charset="-128"/>
+              </a:defRPr>
+            </a:lvl8pPr>
+            <a:lvl9pPr marL="3886200" indent="-228600" eaLnBrk="0" fontAlgn="base" hangingPunct="0">
+              <a:spcBef>
+                <a:spcPct val="0"/>
+              </a:spcBef>
+              <a:spcAft>
+                <a:spcPct val="0"/>
+              </a:spcAft>
+              <a:defRPr sz="1400" b="1">
+                <a:solidFill>
+                  <a:srgbClr val="000000"/>
+                </a:solidFill>
+                <a:latin typeface="Arial" pitchFamily="34" charset="0"/>
+                <a:ea typeface="MS PGothic" pitchFamily="34" charset="-128"/>
+              </a:defRPr>
+            </a:lvl9pPr>
+          </a:lstStyle>
+          <a:p>
+            <a:pPr marL="0" marR="0" lvl="0" indent="0" algn="l" defTabSz="457181" rtl="0" eaLnBrk="1" fontAlgn="auto" latinLnBrk="0" hangingPunct="1">
+              <a:lnSpc>
+                <a:spcPct val="100000"/>
+              </a:lnSpc>
+              <a:spcBef>
+                <a:spcPts val="0"/>
+              </a:spcBef>
+              <a:spcAft>
+                <a:spcPts val="0"/>
+              </a:spcAft>
+              <a:buClrTx/>
+              <a:buSzTx/>
+              <a:buFontTx/>
+              <a:buNone/>
+              <a:tabLst/>
+              <a:defRPr/>
+            </a:pPr>
+            <a:r>
+              <a:rPr kumimoji="0" lang="en-US" altLang="en-US" sz="1600" b="0" i="0" u="none" strike="noStrike" kern="1200" cap="none" spc="0" normalizeH="0" baseline="0" noProof="0" dirty="0">
+                <a:ln>
+                  <a:noFill/>
+                </a:ln>
+                <a:solidFill>
+                  <a:srgbClr val="414444"/>
+                </a:solidFill>
+                <a:effectLst/>
+                <a:uLnTx/>
+                <a:uFillTx/>
+                <a:latin typeface="Gill Sans MT"/>
+                <a:ea typeface="MS PGothic" pitchFamily="34" charset="-128"/>
+                <a:cs typeface="+mn-cs"/>
+              </a:rPr>
+              <a:t>CMSIS-CORE header files generated from CMSIS-SVD</a:t>
+            </a:r>
+          </a:p>
+        </p:txBody>
+      </p:sp>
+      <p:sp>
+        <p:nvSpPr>
+          <p:cNvPr id="31" name="Snip Single Corner Rectangle 30"/>
+          <p:cNvSpPr/>
+          <p:nvPr/>
+        </p:nvSpPr>
+        <p:spPr bwMode="auto">
+          <a:xfrm>
+            <a:off x="820738" y="5540687"/>
+            <a:ext cx="552307" cy="332315"/>
+          </a:xfrm>
+          <a:prstGeom prst="snip1Rect">
+            <a:avLst/>
+          </a:prstGeom>
+          <a:solidFill>
+            <a:srgbClr val="B5CDD8">
+              <a:alpha val="50000"/>
+            </a:srgbClr>
+          </a:solidFill>
+          <a:ln w="9525" cap="flat" cmpd="sng" algn="ctr">
+            <a:solidFill>
+              <a:schemeClr val="tx1"/>
+            </a:solidFill>
+            <a:prstDash val="solid"/>
+            <a:round/>
+            <a:headEnd type="none" w="med" len="med"/>
+            <a:tailEnd type="triangle" w="lg" len="med"/>
+          </a:ln>
+          <a:effectLst/>
+        </p:spPr>
+        <p:txBody>
+          <a:bodyPr wrap="none" lIns="121899" tIns="60949" rIns="121899" bIns="60949" anchor="b" anchorCtr="1"/>
+          <a:lstStyle/>
+          <a:p>
+            <a:pPr marL="0" marR="0" lvl="0" indent="0" algn="ctr" defTabSz="457181" rtl="0" eaLnBrk="1" fontAlgn="auto" latinLnBrk="0" hangingPunct="1">
+              <a:lnSpc>
+                <a:spcPct val="100000"/>
+              </a:lnSpc>
+              <a:spcBef>
+                <a:spcPts val="0"/>
+              </a:spcBef>
+              <a:spcAft>
+                <a:spcPts val="0"/>
+              </a:spcAft>
+              <a:buClrTx/>
+              <a:buSzTx/>
+              <a:buFontTx/>
+              <a:buNone/>
+              <a:tabLst/>
+              <a:defRPr/>
+            </a:pPr>
+            <a:endParaRPr kumimoji="0" lang="en-US" sz="1600" b="0" i="0" u="none" strike="noStrike" kern="1200" cap="none" spc="0" normalizeH="0" baseline="0" noProof="0" dirty="0">
+              <a:ln>
+                <a:noFill/>
+              </a:ln>
+              <a:solidFill>
+                <a:srgbClr val="414444"/>
+              </a:solidFill>
+              <a:effectLst/>
+              <a:uLnTx/>
+              <a:uFillTx/>
+              <a:latin typeface="Courier New" pitchFamily="49" charset="0"/>
+              <a:ea typeface="+mn-ea"/>
+              <a:cs typeface="Courier New" pitchFamily="49" charset="0"/>
+            </a:endParaRPr>
+          </a:p>
+        </p:txBody>
+      </p:sp>
+      <p:sp>
+        <p:nvSpPr>
+          <p:cNvPr id="32" name="Rectangle 16"/>
+          <p:cNvSpPr>
+            <a:spLocks noChangeArrowheads="1"/>
+          </p:cNvSpPr>
+          <p:nvPr/>
+        </p:nvSpPr>
+        <p:spPr bwMode="auto">
+          <a:xfrm>
+            <a:off x="1373045" y="5523857"/>
+            <a:ext cx="1496465" cy="369310"/>
+          </a:xfrm>
+          <a:prstGeom prst="rect">
+            <a:avLst/>
+          </a:prstGeom>
+          <a:noFill/>
+          <a:ln>
+            <a:noFill/>
+          </a:ln>
+          <a:extLst>
+            <a:ext uri="{909E8E84-426E-40DD-AFC4-6F175D3DCCD1}">
+              <a14:hiddenFill xmlns:a14="http://schemas.microsoft.com/office/drawing/2010/main">
+                <a:solidFill>
+                  <a:srgbClr val="FFFFFF"/>
+                </a:solidFill>
+              </a14:hiddenFill>
+            </a:ext>
+            <a:ext uri="{91240B29-F687-4F45-9708-019B960494DF}">
+              <a14:hiddenLine xmlns:a14="http://schemas.microsoft.com/office/drawing/2010/main" w="9525">
+                <a:solidFill>
+                  <a:srgbClr val="000000"/>
+                </a:solidFill>
+                <a:miter lim="800000"/>
+                <a:headEnd/>
+                <a:tailEnd/>
+              </a14:hiddenLine>
+            </a:ext>
+          </a:extLst>
+        </p:spPr>
+        <p:txBody>
+          <a:bodyPr wrap="square" lIns="121899" tIns="60949" rIns="121899" bIns="60949">
+            <a:spAutoFit/>
+          </a:bodyPr>
+          <a:lstStyle>
+            <a:lvl1pPr eaLnBrk="0" hangingPunct="0">
+              <a:defRPr sz="1400" b="1">
+                <a:solidFill>
+                  <a:srgbClr val="000000"/>
+                </a:solidFill>
+                <a:latin typeface="Arial" pitchFamily="34" charset="0"/>
+                <a:ea typeface="MS PGothic" pitchFamily="34" charset="-128"/>
+              </a:defRPr>
+            </a:lvl1pPr>
+            <a:lvl2pPr marL="742950" indent="-285750" eaLnBrk="0" hangingPunct="0">
+              <a:defRPr sz="1400" b="1">
+                <a:solidFill>
+                  <a:srgbClr val="000000"/>
+                </a:solidFill>
+                <a:latin typeface="Arial" pitchFamily="34" charset="0"/>
+                <a:ea typeface="MS PGothic" pitchFamily="34" charset="-128"/>
+              </a:defRPr>
+            </a:lvl2pPr>
+            <a:lvl3pPr marL="1143000" indent="-228600" eaLnBrk="0" hangingPunct="0">
+              <a:defRPr sz="1400" b="1">
+                <a:solidFill>
+                  <a:srgbClr val="000000"/>
+                </a:solidFill>
+                <a:latin typeface="Arial" pitchFamily="34" charset="0"/>
+                <a:ea typeface="MS PGothic" pitchFamily="34" charset="-128"/>
+              </a:defRPr>
+            </a:lvl3pPr>
+            <a:lvl4pPr marL="1600200" indent="-228600" eaLnBrk="0" hangingPunct="0">
+              <a:defRPr sz="1400" b="1">
+                <a:solidFill>
+                  <a:srgbClr val="000000"/>
+                </a:solidFill>
+                <a:latin typeface="Arial" pitchFamily="34" charset="0"/>
+                <a:ea typeface="MS PGothic" pitchFamily="34" charset="-128"/>
+              </a:defRPr>
+            </a:lvl4pPr>
+            <a:lvl5pPr marL="2057400" indent="-228600" eaLnBrk="0" hangingPunct="0">
+              <a:defRPr sz="1400" b="1">
+                <a:solidFill>
+                  <a:srgbClr val="000000"/>
+                </a:solidFill>
+                <a:latin typeface="Arial" pitchFamily="34" charset="0"/>
+                <a:ea typeface="MS PGothic" pitchFamily="34" charset="-128"/>
+              </a:defRPr>
+            </a:lvl5pPr>
+            <a:lvl6pPr marL="2514600" indent="-228600" eaLnBrk="0" fontAlgn="base" hangingPunct="0">
+              <a:spcBef>
+                <a:spcPct val="0"/>
+              </a:spcBef>
+              <a:spcAft>
+                <a:spcPct val="0"/>
+              </a:spcAft>
+              <a:defRPr sz="1400" b="1">
+                <a:solidFill>
+                  <a:srgbClr val="000000"/>
+                </a:solidFill>
+                <a:latin typeface="Arial" pitchFamily="34" charset="0"/>
+                <a:ea typeface="MS PGothic" pitchFamily="34" charset="-128"/>
+              </a:defRPr>
+            </a:lvl6pPr>
+            <a:lvl7pPr marL="2971800" indent="-228600" eaLnBrk="0" fontAlgn="base" hangingPunct="0">
+              <a:spcBef>
+                <a:spcPct val="0"/>
+              </a:spcBef>
+              <a:spcAft>
+                <a:spcPct val="0"/>
+              </a:spcAft>
+              <a:defRPr sz="1400" b="1">
+                <a:solidFill>
+                  <a:srgbClr val="000000"/>
+                </a:solidFill>
+                <a:latin typeface="Arial" pitchFamily="34" charset="0"/>
+                <a:ea typeface="MS PGothic" pitchFamily="34" charset="-128"/>
+              </a:defRPr>
+            </a:lvl7pPr>
+            <a:lvl8pPr marL="3429000" indent="-228600" eaLnBrk="0" fontAlgn="base" hangingPunct="0">
+              <a:spcBef>
+                <a:spcPct val="0"/>
+              </a:spcBef>
+              <a:spcAft>
+                <a:spcPct val="0"/>
+              </a:spcAft>
+              <a:defRPr sz="1400" b="1">
+                <a:solidFill>
+                  <a:srgbClr val="000000"/>
+                </a:solidFill>
+                <a:latin typeface="Arial" pitchFamily="34" charset="0"/>
+                <a:ea typeface="MS PGothic" pitchFamily="34" charset="-128"/>
+              </a:defRPr>
+            </a:lvl8pPr>
+            <a:lvl9pPr marL="3886200" indent="-228600" eaLnBrk="0" fontAlgn="base" hangingPunct="0">
+              <a:spcBef>
+                <a:spcPct val="0"/>
+              </a:spcBef>
+              <a:spcAft>
+                <a:spcPct val="0"/>
+              </a:spcAft>
+              <a:defRPr sz="1400" b="1">
+                <a:solidFill>
+                  <a:srgbClr val="000000"/>
+                </a:solidFill>
+                <a:latin typeface="Arial" pitchFamily="34" charset="0"/>
+                <a:ea typeface="MS PGothic" pitchFamily="34" charset="-128"/>
+              </a:defRPr>
+            </a:lvl9pPr>
+          </a:lstStyle>
+          <a:p>
+            <a:pPr marL="0" marR="0" lvl="0" indent="0" algn="l" defTabSz="457181" rtl="0" eaLnBrk="1" fontAlgn="auto" latinLnBrk="0" hangingPunct="1">
+              <a:lnSpc>
+                <a:spcPct val="100000"/>
+              </a:lnSpc>
+              <a:spcBef>
+                <a:spcPts val="0"/>
+              </a:spcBef>
+              <a:spcAft>
+                <a:spcPts val="0"/>
+              </a:spcAft>
+              <a:buClrTx/>
+              <a:buSzTx/>
+              <a:buFontTx/>
+              <a:buNone/>
+              <a:tabLst/>
+              <a:defRPr/>
+            </a:pPr>
+            <a:r>
+              <a:rPr kumimoji="0" lang="en-US" altLang="en-US" sz="1600" b="0" i="0" u="none" strike="noStrike" kern="1200" cap="none" spc="0" normalizeH="0" baseline="0" noProof="0" dirty="0">
+                <a:ln>
+                  <a:noFill/>
+                </a:ln>
+                <a:solidFill>
+                  <a:srgbClr val="414444"/>
+                </a:solidFill>
+                <a:effectLst/>
+                <a:uLnTx/>
+                <a:uFillTx/>
+                <a:latin typeface="Gill Sans MT"/>
+                <a:ea typeface="MS PGothic" pitchFamily="34" charset="-128"/>
+                <a:cs typeface="+mn-cs"/>
+              </a:rPr>
+              <a:t>User program</a:t>
+            </a:r>
+            <a:endParaRPr kumimoji="0" lang="en-US" altLang="en-US" sz="1600" b="1" i="0" u="none" strike="noStrike" kern="1200" cap="none" spc="0" normalizeH="0" baseline="0" noProof="0" dirty="0">
+              <a:ln>
+                <a:noFill/>
+              </a:ln>
+              <a:solidFill>
+                <a:srgbClr val="414444"/>
+              </a:solidFill>
+              <a:effectLst/>
+              <a:uLnTx/>
+              <a:uFillTx/>
+              <a:latin typeface="Gill Sans MT"/>
+              <a:ea typeface="MS PGothic" pitchFamily="34" charset="-128"/>
+              <a:cs typeface="+mn-cs"/>
+            </a:endParaRPr>
+          </a:p>
+        </p:txBody>
+      </p:sp>
+      <p:sp>
+        <p:nvSpPr>
+          <p:cNvPr id="33" name="Snip Single Corner Rectangle 32"/>
+          <p:cNvSpPr/>
+          <p:nvPr/>
+        </p:nvSpPr>
+        <p:spPr bwMode="auto">
+          <a:xfrm>
+            <a:off x="3922030" y="5036969"/>
+            <a:ext cx="552307" cy="325967"/>
+          </a:xfrm>
+          <a:prstGeom prst="snip1Rect">
+            <a:avLst/>
+          </a:prstGeom>
+          <a:solidFill>
+            <a:schemeClr val="accent2">
+              <a:lumMod val="40000"/>
+              <a:lumOff val="60000"/>
+              <a:alpha val="85000"/>
+            </a:schemeClr>
+          </a:solidFill>
+          <a:ln w="9525" cap="flat" cmpd="sng" algn="ctr">
+            <a:solidFill>
+              <a:schemeClr val="tx1"/>
+            </a:solidFill>
+            <a:prstDash val="solid"/>
+            <a:round/>
+            <a:headEnd type="none" w="med" len="med"/>
+            <a:tailEnd type="triangle" w="lg" len="med"/>
+          </a:ln>
+          <a:effectLst/>
+        </p:spPr>
+        <p:txBody>
+          <a:bodyPr wrap="none" lIns="121899" tIns="60949" rIns="121899" bIns="60949" anchor="b" anchorCtr="1"/>
+          <a:lstStyle/>
+          <a:p>
+            <a:pPr marL="0" marR="0" lvl="0" indent="0" algn="ctr" defTabSz="457181" rtl="0" eaLnBrk="1" fontAlgn="auto" latinLnBrk="0" hangingPunct="1">
+              <a:lnSpc>
+                <a:spcPct val="100000"/>
+              </a:lnSpc>
+              <a:spcBef>
+                <a:spcPts val="0"/>
+              </a:spcBef>
+              <a:spcAft>
+                <a:spcPts val="0"/>
+              </a:spcAft>
+              <a:buClrTx/>
+              <a:buSzTx/>
+              <a:buFontTx/>
+              <a:buNone/>
+              <a:tabLst/>
+              <a:defRPr/>
+            </a:pPr>
+            <a:endParaRPr kumimoji="0" lang="en-US" sz="1600" b="0" i="0" u="none" strike="noStrike" kern="1200" cap="none" spc="0" normalizeH="0" baseline="0" noProof="0" dirty="0">
+              <a:ln>
+                <a:noFill/>
+              </a:ln>
+              <a:solidFill>
+                <a:srgbClr val="414444"/>
+              </a:solidFill>
+              <a:effectLst/>
+              <a:uLnTx/>
+              <a:uFillTx/>
+              <a:latin typeface="Gill Sans MT"/>
+              <a:ea typeface="+mn-ea"/>
+              <a:cs typeface="Courier New" pitchFamily="49" charset="0"/>
+            </a:endParaRPr>
+          </a:p>
+        </p:txBody>
+      </p:sp>
+      <p:sp>
+        <p:nvSpPr>
+          <p:cNvPr id="15" name="Snip Single Corner Rectangle 23">
+            <a:extLst>
+              <a:ext uri="{FF2B5EF4-FFF2-40B4-BE49-F238E27FC236}">
+                <a16:creationId xmlns:a16="http://schemas.microsoft.com/office/drawing/2014/main" id="{88719D49-E284-46F1-B1CB-E837705D3DCD}"/>
+              </a:ext>
+            </a:extLst>
+          </p:cNvPr>
+          <p:cNvSpPr/>
+          <p:nvPr/>
+        </p:nvSpPr>
+        <p:spPr bwMode="auto">
+          <a:xfrm>
+            <a:off x="7022577" y="2796907"/>
+            <a:ext cx="2412000" cy="936000"/>
+          </a:xfrm>
+          <a:prstGeom prst="snip1Rect">
+            <a:avLst/>
+          </a:prstGeom>
+          <a:solidFill>
+            <a:srgbClr val="FFFFCC"/>
+          </a:solidFill>
+          <a:ln w="9525" cap="flat" cmpd="sng" algn="ctr">
+            <a:solidFill>
+              <a:schemeClr val="tx1"/>
+            </a:solidFill>
+            <a:prstDash val="solid"/>
+            <a:round/>
+            <a:headEnd type="none" w="med" len="med"/>
+            <a:tailEnd type="triangle" w="med" len="med"/>
+          </a:ln>
+          <a:effectLst/>
+        </p:spPr>
+        <p:txBody>
+          <a:bodyPr wrap="none" anchor="t" anchorCtr="1"/>
+          <a:lstStyle/>
+          <a:p>
+            <a:pPr marL="0" marR="0" lvl="0" indent="0" algn="ctr" defTabSz="457181" rtl="0" eaLnBrk="1" fontAlgn="auto" latinLnBrk="0" hangingPunct="1">
+              <a:lnSpc>
+                <a:spcPct val="100000"/>
+              </a:lnSpc>
+              <a:spcBef>
+                <a:spcPts val="0"/>
+              </a:spcBef>
+              <a:spcAft>
+                <a:spcPts val="0"/>
+              </a:spcAft>
+              <a:buClrTx/>
+              <a:buSzTx/>
+              <a:buFontTx/>
+              <a:buNone/>
+              <a:tabLst/>
+              <a:defRPr/>
+            </a:pPr>
+            <a:r>
+              <a:rPr kumimoji="0" lang="en-US" sz="1400" b="0" i="0" u="none" strike="noStrike" kern="1200" cap="none" spc="0" normalizeH="0" baseline="0" noProof="0" dirty="0" err="1">
+                <a:ln>
+                  <a:noFill/>
+                </a:ln>
+                <a:solidFill>
+                  <a:srgbClr val="414444"/>
+                </a:solidFill>
+                <a:effectLst/>
+                <a:uLnTx/>
+                <a:uFillTx/>
+                <a:latin typeface="Courier New" panose="02070309020205020404" pitchFamily="49" charset="0"/>
+                <a:ea typeface="+mn-ea"/>
+                <a:cs typeface="Courier New" panose="02070309020205020404" pitchFamily="49" charset="0"/>
+              </a:rPr>
+              <a:t>partition_</a:t>
+            </a:r>
+            <a:r>
+              <a:rPr kumimoji="0" lang="en-US" sz="1400" b="0" u="none" strike="noStrike" kern="1200" cap="none" spc="0" normalizeH="0" baseline="0" noProof="0" dirty="0" err="1">
+                <a:ln>
+                  <a:noFill/>
+                </a:ln>
+                <a:solidFill>
+                  <a:srgbClr val="414444"/>
+                </a:solidFill>
+                <a:effectLst/>
+                <a:uLnTx/>
+                <a:uFillTx/>
+                <a:latin typeface="Courier New" panose="02070309020205020404" pitchFamily="49" charset="0"/>
+                <a:ea typeface="+mn-ea"/>
+                <a:cs typeface="Courier New" panose="02070309020205020404" pitchFamily="49" charset="0"/>
+              </a:rPr>
+              <a:t>gen</a:t>
+            </a:r>
+            <a:r>
+              <a:rPr kumimoji="0" lang="en-US" sz="1400" b="0" i="0" u="none" strike="noStrike" kern="1200" cap="none" spc="0" normalizeH="0" baseline="0" noProof="0" dirty="0" err="1">
+                <a:ln>
+                  <a:noFill/>
+                </a:ln>
+                <a:solidFill>
+                  <a:srgbClr val="414444"/>
+                </a:solidFill>
+                <a:effectLst/>
+                <a:uLnTx/>
+                <a:uFillTx/>
+                <a:latin typeface="Courier New" panose="02070309020205020404" pitchFamily="49" charset="0"/>
+                <a:ea typeface="+mn-ea"/>
+                <a:cs typeface="Courier New" panose="02070309020205020404" pitchFamily="49" charset="0"/>
+              </a:rPr>
+              <a:t>.h</a:t>
+            </a:r>
+            <a:br>
+              <a:rPr kumimoji="0" lang="en-US" sz="1600" b="0" i="0" u="none" strike="noStrike" kern="1200" cap="none" spc="0" normalizeH="0" baseline="0" noProof="0" dirty="0">
+                <a:ln>
+                  <a:noFill/>
+                </a:ln>
+                <a:solidFill>
+                  <a:srgbClr val="414444"/>
+                </a:solidFill>
+                <a:effectLst/>
+                <a:uLnTx/>
+                <a:uFillTx/>
+                <a:latin typeface="Gill Sans MT"/>
+                <a:ea typeface="+mn-ea"/>
+                <a:cs typeface="+mn-cs"/>
+              </a:rPr>
+            </a:br>
+            <a:r>
+              <a:rPr kumimoji="0" lang="en-US" sz="1600" b="0" i="0" u="none" strike="noStrike" kern="1200" cap="none" spc="0" normalizeH="0" baseline="0" noProof="0" dirty="0">
+                <a:ln>
+                  <a:noFill/>
+                </a:ln>
+                <a:solidFill>
+                  <a:srgbClr val="414444"/>
+                </a:solidFill>
+                <a:effectLst/>
+                <a:uLnTx/>
+                <a:uFillTx/>
+                <a:latin typeface="Gill Sans MT"/>
+                <a:ea typeface="+mn-ea"/>
+                <a:cs typeface="+mn-cs"/>
+              </a:rPr>
+              <a:t>  </a:t>
+            </a:r>
+            <a:r>
+              <a:rPr lang="en-US" sz="1600" dirty="0">
+                <a:solidFill>
+                  <a:srgbClr val="414444"/>
+                </a:solidFill>
+                <a:latin typeface="Calibri" panose="020F0502020204030204" pitchFamily="34" charset="0"/>
+                <a:cs typeface="Calibri" panose="020F0502020204030204" pitchFamily="34" charset="0"/>
+              </a:rPr>
+              <a:t>SAU regions and</a:t>
+            </a:r>
+          </a:p>
+          <a:p>
+            <a:pPr marL="0" marR="0" lvl="0" indent="0" algn="ctr" defTabSz="457181" rtl="0" eaLnBrk="1" fontAlgn="auto" latinLnBrk="0" hangingPunct="1">
+              <a:lnSpc>
+                <a:spcPct val="100000"/>
+              </a:lnSpc>
+              <a:spcBef>
+                <a:spcPts val="0"/>
+              </a:spcBef>
+              <a:spcAft>
+                <a:spcPts val="0"/>
+              </a:spcAft>
+              <a:buClrTx/>
+              <a:buSzTx/>
+              <a:buFontTx/>
+              <a:buNone/>
+              <a:tabLst/>
+              <a:defRPr/>
+            </a:pPr>
+            <a:r>
+              <a:rPr lang="en-US" sz="1600" dirty="0">
+                <a:solidFill>
+                  <a:srgbClr val="414444"/>
+                </a:solidFill>
+                <a:latin typeface="Calibri" panose="020F0502020204030204" pitchFamily="34" charset="0"/>
+                <a:cs typeface="Calibri" panose="020F0502020204030204" pitchFamily="34" charset="0"/>
+              </a:rPr>
+              <a:t>NVIC ISR assignment</a:t>
+            </a:r>
+          </a:p>
+        </p:txBody>
+      </p:sp>
+      <p:cxnSp>
+        <p:nvCxnSpPr>
+          <p:cNvPr id="16" name="Straight Arrow Connector 26">
+            <a:extLst>
+              <a:ext uri="{FF2B5EF4-FFF2-40B4-BE49-F238E27FC236}">
+                <a16:creationId xmlns:a16="http://schemas.microsoft.com/office/drawing/2014/main" id="{16C169E5-557C-42A2-8DCA-D9B4036FD3FC}"/>
+              </a:ext>
+            </a:extLst>
+          </p:cNvPr>
+          <p:cNvCxnSpPr>
+            <a:cxnSpLocks noChangeShapeType="1"/>
+            <a:stCxn id="15" idx="2"/>
+          </p:cNvCxnSpPr>
+          <p:nvPr/>
+        </p:nvCxnSpPr>
+        <p:spPr bwMode="auto">
+          <a:xfrm flipH="1">
+            <a:off x="6334030" y="3264907"/>
+            <a:ext cx="688547" cy="0"/>
+          </a:xfrm>
+          <a:prstGeom prst="straightConnector1">
+            <a:avLst/>
+          </a:prstGeom>
+          <a:noFill/>
+          <a:ln w="9525" algn="ctr">
+            <a:solidFill>
+              <a:schemeClr val="tx1"/>
+            </a:solidFill>
+            <a:round/>
+            <a:headEnd/>
+            <a:tailEnd type="triangle" w="med" len="med"/>
+          </a:ln>
+          <a:extLst>
+            <a:ext uri="{909E8E84-426E-40DD-AFC4-6F175D3DCCD1}">
+              <a14:hiddenFill xmlns:a14="http://schemas.microsoft.com/office/drawing/2010/main">
+                <a:noFill/>
+              </a14:hiddenFill>
+            </a:ext>
+          </a:extLst>
+        </p:spPr>
+      </p:cxnSp>
+      <p:sp>
+        <p:nvSpPr>
+          <p:cNvPr id="17" name="Snip Single Corner Rectangle 27">
+            <a:extLst>
+              <a:ext uri="{FF2B5EF4-FFF2-40B4-BE49-F238E27FC236}">
+                <a16:creationId xmlns:a16="http://schemas.microsoft.com/office/drawing/2014/main" id="{C6AD2BC6-7BF0-47B4-9211-48B46D79B2E9}"/>
+              </a:ext>
+            </a:extLst>
+          </p:cNvPr>
+          <p:cNvSpPr/>
+          <p:nvPr/>
+        </p:nvSpPr>
+        <p:spPr bwMode="auto">
+          <a:xfrm>
+            <a:off x="7022577" y="5036969"/>
+            <a:ext cx="552307" cy="330201"/>
+          </a:xfrm>
+          <a:prstGeom prst="snip1Rect">
+            <a:avLst/>
+          </a:prstGeom>
+          <a:solidFill>
+            <a:srgbClr val="FFFFCC"/>
+          </a:solidFill>
+          <a:ln w="9525" cap="flat" cmpd="sng" algn="ctr">
+            <a:solidFill>
+              <a:schemeClr val="tx1"/>
+            </a:solidFill>
+            <a:prstDash val="solid"/>
+            <a:round/>
+            <a:headEnd type="none" w="med" len="med"/>
+            <a:tailEnd type="triangle" w="lg" len="med"/>
+          </a:ln>
+          <a:effectLst/>
+        </p:spPr>
+        <p:txBody>
+          <a:bodyPr wrap="none" lIns="121899" tIns="60949" rIns="121899" bIns="60949" anchor="b" anchorCtr="1"/>
+          <a:lstStyle/>
+          <a:p>
+            <a:pPr marL="0" marR="0" lvl="0" indent="0" algn="ctr" defTabSz="457181" rtl="0" eaLnBrk="1" fontAlgn="auto" latinLnBrk="0" hangingPunct="1">
+              <a:lnSpc>
+                <a:spcPct val="100000"/>
+              </a:lnSpc>
+              <a:spcBef>
+                <a:spcPts val="0"/>
+              </a:spcBef>
+              <a:spcAft>
+                <a:spcPts val="0"/>
+              </a:spcAft>
+              <a:buClrTx/>
+              <a:buSzTx/>
+              <a:buFontTx/>
+              <a:buNone/>
+              <a:tabLst/>
+              <a:defRPr/>
+            </a:pPr>
+            <a:endParaRPr kumimoji="0" lang="en-US" sz="1600" b="0" i="0" u="none" strike="noStrike" kern="1200" cap="none" spc="0" normalizeH="0" baseline="0" noProof="0" dirty="0">
+              <a:ln>
+                <a:noFill/>
+              </a:ln>
+              <a:solidFill>
+                <a:srgbClr val="414444"/>
+              </a:solidFill>
+              <a:effectLst/>
+              <a:uLnTx/>
+              <a:uFillTx/>
+              <a:latin typeface="Gill Sans MT"/>
+              <a:ea typeface="+mn-ea"/>
+              <a:cs typeface="Courier New" pitchFamily="49" charset="0"/>
+            </a:endParaRPr>
+          </a:p>
+        </p:txBody>
+      </p:sp>
+      <p:sp>
+        <p:nvSpPr>
+          <p:cNvPr id="18" name="Rectangle 12">
+            <a:extLst>
+              <a:ext uri="{FF2B5EF4-FFF2-40B4-BE49-F238E27FC236}">
+                <a16:creationId xmlns:a16="http://schemas.microsoft.com/office/drawing/2014/main" id="{B6780F5D-C3DF-42C6-9644-FAAE8F805F0B}"/>
+              </a:ext>
+            </a:extLst>
+          </p:cNvPr>
+          <p:cNvSpPr>
+            <a:spLocks noChangeArrowheads="1"/>
+          </p:cNvSpPr>
+          <p:nvPr/>
+        </p:nvSpPr>
+        <p:spPr bwMode="auto">
+          <a:xfrm>
+            <a:off x="7574885" y="5017414"/>
+            <a:ext cx="2195922" cy="615531"/>
+          </a:xfrm>
+          <a:prstGeom prst="rect">
+            <a:avLst/>
+          </a:prstGeom>
+          <a:noFill/>
+          <a:ln>
+            <a:noFill/>
+          </a:ln>
+          <a:extLst>
+            <a:ext uri="{909E8E84-426E-40DD-AFC4-6F175D3DCCD1}">
+              <a14:hiddenFill xmlns:a14="http://schemas.microsoft.com/office/drawing/2010/main">
+                <a:solidFill>
+                  <a:srgbClr val="FFFFFF"/>
+                </a:solidFill>
+              </a14:hiddenFill>
+            </a:ext>
+            <a:ext uri="{91240B29-F687-4F45-9708-019B960494DF}">
+              <a14:hiddenLine xmlns:a14="http://schemas.microsoft.com/office/drawing/2010/main" w="9525">
+                <a:solidFill>
+                  <a:srgbClr val="000000"/>
+                </a:solidFill>
+                <a:miter lim="800000"/>
+                <a:headEnd/>
+                <a:tailEnd/>
+              </a14:hiddenLine>
+            </a:ext>
+          </a:extLst>
+        </p:spPr>
+        <p:txBody>
+          <a:bodyPr wrap="square" lIns="121899" tIns="60949" rIns="121899" bIns="60949">
+            <a:spAutoFit/>
+          </a:bodyPr>
+          <a:lstStyle>
+            <a:lvl1pPr eaLnBrk="0" hangingPunct="0">
+              <a:defRPr sz="1400" b="1">
+                <a:solidFill>
+                  <a:srgbClr val="000000"/>
+                </a:solidFill>
+                <a:latin typeface="Arial" pitchFamily="34" charset="0"/>
+                <a:ea typeface="MS PGothic" pitchFamily="34" charset="-128"/>
+              </a:defRPr>
+            </a:lvl1pPr>
+            <a:lvl2pPr marL="742950" indent="-285750" eaLnBrk="0" hangingPunct="0">
+              <a:defRPr sz="1400" b="1">
+                <a:solidFill>
+                  <a:srgbClr val="000000"/>
+                </a:solidFill>
+                <a:latin typeface="Arial" pitchFamily="34" charset="0"/>
+                <a:ea typeface="MS PGothic" pitchFamily="34" charset="-128"/>
+              </a:defRPr>
+            </a:lvl2pPr>
+            <a:lvl3pPr marL="1143000" indent="-228600" eaLnBrk="0" hangingPunct="0">
+              <a:defRPr sz="1400" b="1">
+                <a:solidFill>
+                  <a:srgbClr val="000000"/>
+                </a:solidFill>
+                <a:latin typeface="Arial" pitchFamily="34" charset="0"/>
+                <a:ea typeface="MS PGothic" pitchFamily="34" charset="-128"/>
+              </a:defRPr>
+            </a:lvl3pPr>
+            <a:lvl4pPr marL="1600200" indent="-228600" eaLnBrk="0" hangingPunct="0">
+              <a:defRPr sz="1400" b="1">
+                <a:solidFill>
+                  <a:srgbClr val="000000"/>
+                </a:solidFill>
+                <a:latin typeface="Arial" pitchFamily="34" charset="0"/>
+                <a:ea typeface="MS PGothic" pitchFamily="34" charset="-128"/>
+              </a:defRPr>
+            </a:lvl4pPr>
+            <a:lvl5pPr marL="2057400" indent="-228600" eaLnBrk="0" hangingPunct="0">
+              <a:defRPr sz="1400" b="1">
+                <a:solidFill>
+                  <a:srgbClr val="000000"/>
+                </a:solidFill>
+                <a:latin typeface="Arial" pitchFamily="34" charset="0"/>
+                <a:ea typeface="MS PGothic" pitchFamily="34" charset="-128"/>
+              </a:defRPr>
+            </a:lvl5pPr>
+            <a:lvl6pPr marL="2514600" indent="-228600" eaLnBrk="0" fontAlgn="base" hangingPunct="0">
+              <a:spcBef>
+                <a:spcPct val="0"/>
+              </a:spcBef>
+              <a:spcAft>
+                <a:spcPct val="0"/>
+              </a:spcAft>
+              <a:defRPr sz="1400" b="1">
+                <a:solidFill>
+                  <a:srgbClr val="000000"/>
+                </a:solidFill>
+                <a:latin typeface="Arial" pitchFamily="34" charset="0"/>
+                <a:ea typeface="MS PGothic" pitchFamily="34" charset="-128"/>
+              </a:defRPr>
+            </a:lvl6pPr>
+            <a:lvl7pPr marL="2971800" indent="-228600" eaLnBrk="0" fontAlgn="base" hangingPunct="0">
+              <a:spcBef>
+                <a:spcPct val="0"/>
+              </a:spcBef>
+              <a:spcAft>
+                <a:spcPct val="0"/>
+              </a:spcAft>
+              <a:defRPr sz="1400" b="1">
+                <a:solidFill>
+                  <a:srgbClr val="000000"/>
+                </a:solidFill>
+                <a:latin typeface="Arial" pitchFamily="34" charset="0"/>
+                <a:ea typeface="MS PGothic" pitchFamily="34" charset="-128"/>
+              </a:defRPr>
+            </a:lvl7pPr>
+            <a:lvl8pPr marL="3429000" indent="-228600" eaLnBrk="0" fontAlgn="base" hangingPunct="0">
+              <a:spcBef>
+                <a:spcPct val="0"/>
+              </a:spcBef>
+              <a:spcAft>
+                <a:spcPct val="0"/>
+              </a:spcAft>
+              <a:defRPr sz="1400" b="1">
+                <a:solidFill>
+                  <a:srgbClr val="000000"/>
+                </a:solidFill>
+                <a:latin typeface="Arial" pitchFamily="34" charset="0"/>
+                <a:ea typeface="MS PGothic" pitchFamily="34" charset="-128"/>
+              </a:defRPr>
+            </a:lvl8pPr>
+            <a:lvl9pPr marL="3886200" indent="-228600" eaLnBrk="0" fontAlgn="base" hangingPunct="0">
+              <a:spcBef>
+                <a:spcPct val="0"/>
+              </a:spcBef>
+              <a:spcAft>
+                <a:spcPct val="0"/>
+              </a:spcAft>
+              <a:defRPr sz="1400" b="1">
+                <a:solidFill>
+                  <a:srgbClr val="000000"/>
+                </a:solidFill>
+                <a:latin typeface="Arial" pitchFamily="34" charset="0"/>
+                <a:ea typeface="MS PGothic" pitchFamily="34" charset="-128"/>
+              </a:defRPr>
+            </a:lvl9pPr>
+          </a:lstStyle>
+          <a:p>
+            <a:pPr marL="0" marR="0" lvl="0" indent="0" algn="l" defTabSz="457181" rtl="0" eaLnBrk="1" fontAlgn="auto" latinLnBrk="0" hangingPunct="1">
+              <a:lnSpc>
+                <a:spcPct val="100000"/>
+              </a:lnSpc>
+              <a:spcBef>
+                <a:spcPts val="0"/>
+              </a:spcBef>
+              <a:spcAft>
+                <a:spcPts val="0"/>
+              </a:spcAft>
+              <a:buClrTx/>
+              <a:buSzTx/>
+              <a:buFontTx/>
+              <a:buNone/>
+              <a:tabLst/>
+              <a:defRPr/>
+            </a:pPr>
+            <a:r>
+              <a:rPr kumimoji="0" lang="en-US" altLang="en-US" sz="1600" b="0" i="0" u="none" strike="noStrike" kern="1200" cap="none" spc="0" normalizeH="0" baseline="0" noProof="0" dirty="0">
+                <a:ln>
+                  <a:noFill/>
+                </a:ln>
+                <a:solidFill>
+                  <a:srgbClr val="414444"/>
+                </a:solidFill>
+                <a:effectLst/>
+                <a:uLnTx/>
+                <a:uFillTx/>
+                <a:latin typeface="Gill Sans MT"/>
+                <a:ea typeface="MS PGothic" pitchFamily="34" charset="-128"/>
+                <a:cs typeface="+mn-cs"/>
+              </a:rPr>
+              <a:t>CMSIS-Zone generated header files</a:t>
+            </a:r>
+            <a:endParaRPr kumimoji="0" lang="en-US" altLang="en-US" sz="1600" b="1" i="0" u="none" strike="noStrike" kern="1200" cap="none" spc="0" normalizeH="0" baseline="0" noProof="0" dirty="0">
+              <a:ln>
+                <a:noFill/>
+              </a:ln>
+              <a:solidFill>
+                <a:srgbClr val="414444"/>
+              </a:solidFill>
+              <a:effectLst/>
+              <a:uLnTx/>
+              <a:uFillTx/>
+              <a:latin typeface="Gill Sans MT"/>
+              <a:ea typeface="MS PGothic" pitchFamily="34" charset="-128"/>
+              <a:cs typeface="+mn-cs"/>
+            </a:endParaRPr>
+          </a:p>
+        </p:txBody>
+      </p:sp>
+    </p:spTree>
+    <p:extLst>
+      <p:ext uri="{BB962C8B-B14F-4D97-AF65-F5344CB8AC3E}">
+        <p14:creationId xmlns:p14="http://schemas.microsoft.com/office/powerpoint/2010/main" val="258943389"/>
       </p:ext>
     </p:extLst>
   </p:cSld>
@@ -26664,10 +28846,7 @@
               <a:avLst/>
             </a:prstGeom>
             <a:solidFill>
-              <a:schemeClr val="accent3">
-                <a:lumMod val="20000"/>
-                <a:lumOff val="80000"/>
-              </a:schemeClr>
+              <a:srgbClr val="00B0F0"/>
             </a:solidFill>
             <a:ln w="9525" cap="flat" cmpd="sng" algn="ctr">
               <a:solidFill>
@@ -26733,7 +28912,7 @@
               <a:avLst/>
             </a:prstGeom>
             <a:solidFill>
-              <a:srgbClr val="C5EDF8"/>
+              <a:srgbClr val="00B0F0"/>
             </a:solidFill>
             <a:ln w="9525" cap="flat" cmpd="sng" algn="ctr">
               <a:solidFill>
@@ -26806,8 +28985,8 @@
               <a:avLst/>
             </a:prstGeom>
             <a:solidFill>
-              <a:srgbClr val="D5D6D6">
-                <a:alpha val="50000"/>
+              <a:srgbClr val="B5CDD8">
+                <a:alpha val="49804"/>
               </a:srgbClr>
             </a:solidFill>
             <a:ln w="9525" cap="flat" cmpd="sng" algn="ctr">
@@ -27097,10 +29276,7 @@
             <a:avLst/>
           </a:prstGeom>
           <a:solidFill>
-            <a:schemeClr val="accent3">
-              <a:lumMod val="40000"/>
-              <a:lumOff val="60000"/>
-            </a:schemeClr>
+            <a:srgbClr val="00B0F0"/>
           </a:solidFill>
           <a:ln w="9525" cap="flat" cmpd="sng" algn="ctr">
             <a:solidFill>
@@ -27491,7 +29667,7 @@
             <a:avLst/>
           </a:prstGeom>
           <a:solidFill>
-            <a:srgbClr val="D5D6D6">
+            <a:srgbClr val="B5CDD8">
               <a:alpha val="50000"/>
             </a:srgbClr>
           </a:solidFill>
@@ -37303,6 +39479,15 @@
 </file>
 
 <file path=customXml/item1.xml><?xml version="1.0" encoding="utf-8"?>
+<?mso-contentType ?>
+<FormTemplates xmlns="http://schemas.microsoft.com/sharepoint/v3/contenttype/forms">
+  <Display>DocumentLibraryForm</Display>
+  <Edit>DocumentLibraryForm</Edit>
+  <New>DocumentLibraryForm</New>
+</FormTemplates>
+</file>
+
+<file path=customXml/item2.xml><?xml version="1.0" encoding="utf-8"?>
 <ct:contentTypeSchema xmlns:ct="http://schemas.microsoft.com/office/2006/metadata/contentType" xmlns:ma="http://schemas.microsoft.com/office/2006/metadata/properties/metaAttributes" ct:_="" ma:_="" ma:contentTypeName="Document" ma:contentTypeID="0x010100CAE3FC6E4566A44694FF6BF40EC1C126" ma:contentTypeVersion="0" ma:contentTypeDescription="Create a new document." ma:contentTypeScope="" ma:versionID="0c5b8ba185a47c7168257d800a15637f">
   <xsd:schema xmlns:xsd="http://www.w3.org/2001/XMLSchema" xmlns:xs="http://www.w3.org/2001/XMLSchema" xmlns:p="http://schemas.microsoft.com/office/2006/metadata/properties" targetNamespace="http://schemas.microsoft.com/office/2006/metadata/properties" ma:root="true" ma:fieldsID="c64490b4aec6201516c3a874156f37b2">
     <xsd:element name="properties">
@@ -37416,22 +39601,21 @@
 </ct:contentTypeSchema>
 </file>
 
-<file path=customXml/item2.xml><?xml version="1.0" encoding="utf-8"?>
+<file path=customXml/item3.xml><?xml version="1.0" encoding="utf-8"?>
 <p:properties xmlns:p="http://schemas.microsoft.com/office/2006/metadata/properties" xmlns:xsi="http://www.w3.org/2001/XMLSchema-instance">
   <documentManagement/>
 </p:properties>
 </file>
 
-<file path=customXml/item3.xml><?xml version="1.0" encoding="utf-8"?>
-<?mso-contentType ?>
-<FormTemplates xmlns="http://schemas.microsoft.com/sharepoint/v3/contenttype/forms">
-  <Display>DocumentLibraryForm</Display>
-  <Edit>DocumentLibraryForm</Edit>
-  <New>DocumentLibraryForm</New>
-</FormTemplates>
+<file path=customXml/itemProps1.xml><?xml version="1.0" encoding="utf-8"?>
+<ds:datastoreItem xmlns:ds="http://schemas.openxmlformats.org/officeDocument/2006/customXml" ds:itemID="{9C777C69-0744-4BF3-8514-FB149EBD2248}">
+  <ds:schemaRefs>
+    <ds:schemaRef ds:uri="http://schemas.microsoft.com/sharepoint/v3/contenttype/forms"/>
+  </ds:schemaRefs>
+</ds:datastoreItem>
 </file>
 
-<file path=customXml/itemProps1.xml><?xml version="1.0" encoding="utf-8"?>
+<file path=customXml/itemProps2.xml><?xml version="1.0" encoding="utf-8"?>
 <ds:datastoreItem xmlns:ds="http://schemas.openxmlformats.org/officeDocument/2006/customXml" ds:itemID="{FD99A681-1CE7-4872-A113-126DF10B3AAF}">
   <ds:schemaRefs>
     <ds:schemaRef ds:uri="http://schemas.microsoft.com/office/2006/metadata/contentType"/>
@@ -37447,7 +39631,7 @@
 </ds:datastoreItem>
 </file>
 
-<file path=customXml/itemProps2.xml><?xml version="1.0" encoding="utf-8"?>
+<file path=customXml/itemProps3.xml><?xml version="1.0" encoding="utf-8"?>
 <ds:datastoreItem xmlns:ds="http://schemas.openxmlformats.org/officeDocument/2006/customXml" ds:itemID="{AE6E82D6-7FB8-4D99-A7B6-3C5BB1D894B9}">
   <ds:schemaRefs>
     <ds:schemaRef ds:uri="http://purl.org/dc/terms/"/>
@@ -37460,12 +39644,4 @@
     <ds:schemaRef ds:uri="http://schemas.openxmlformats.org/package/2006/metadata/core-properties"/>
   </ds:schemaRefs>
 </ds:datastoreItem>
-</file>
-
-<file path=customXml/itemProps3.xml><?xml version="1.0" encoding="utf-8"?>
-<ds:datastoreItem xmlns:ds="http://schemas.openxmlformats.org/officeDocument/2006/customXml" ds:itemID="{9C777C69-0744-4BF3-8514-FB149EBD2248}">
-  <ds:schemaRefs>
-    <ds:schemaRef ds:uri="http://schemas.microsoft.com/sharepoint/v3/contenttype/forms"/>
-  </ds:schemaRefs>
-</ds:datastoreItem>
 </file>
</xml_diff>